<commit_message>
Added some unit tests to help when doing the unit tests
</commit_message>
<xml_diff>
--- a/CommandLineParser/Exercice CommandLineParser.pptx
+++ b/CommandLineParser/Exercice CommandLineParser.pptx
@@ -9,6 +9,7 @@
     <p:sldId id="257" r:id="rId3"/>
     <p:sldId id="258" r:id="rId4"/>
     <p:sldId id="259" r:id="rId5"/>
+    <p:sldId id="260" r:id="rId6"/>
   </p:sldIdLst>
   <p:sldSz cx="12192000" cy="6858000"/>
   <p:notesSz cx="6858000" cy="9144000"/>
@@ -341,7 +342,7 @@
           <a:p>
             <a:fld id="{11B134D8-D55D-45EA-8DDC-C1E1F664B674}" type="datetimeFigureOut">
               <a:rPr lang="fr-FR" smtClean="0"/>
-              <a:t>09/03/2019</a:t>
+              <a:t>10/03/2019</a:t>
             </a:fld>
             <a:endParaRPr lang="fr-FR"/>
           </a:p>
@@ -549,7 +550,7 @@
           <a:p>
             <a:fld id="{11B134D8-D55D-45EA-8DDC-C1E1F664B674}" type="datetimeFigureOut">
               <a:rPr lang="fr-FR" smtClean="0"/>
-              <a:t>09/03/2019</a:t>
+              <a:t>10/03/2019</a:t>
             </a:fld>
             <a:endParaRPr lang="fr-FR"/>
           </a:p>
@@ -805,7 +806,7 @@
           <a:p>
             <a:fld id="{11B134D8-D55D-45EA-8DDC-C1E1F664B674}" type="datetimeFigureOut">
               <a:rPr lang="fr-FR" smtClean="0"/>
-              <a:t>09/03/2019</a:t>
+              <a:t>10/03/2019</a:t>
             </a:fld>
             <a:endParaRPr lang="fr-FR"/>
           </a:p>
@@ -979,7 +980,7 @@
           <a:p>
             <a:fld id="{11B134D8-D55D-45EA-8DDC-C1E1F664B674}" type="datetimeFigureOut">
               <a:rPr lang="fr-FR" smtClean="0"/>
-              <a:t>09/03/2019</a:t>
+              <a:t>10/03/2019</a:t>
             </a:fld>
             <a:endParaRPr lang="fr-FR"/>
           </a:p>
@@ -1322,7 +1323,7 @@
           <a:p>
             <a:fld id="{11B134D8-D55D-45EA-8DDC-C1E1F664B674}" type="datetimeFigureOut">
               <a:rPr lang="fr-FR" smtClean="0"/>
-              <a:t>09/03/2019</a:t>
+              <a:t>10/03/2019</a:t>
             </a:fld>
             <a:endParaRPr lang="fr-FR"/>
           </a:p>
@@ -1597,7 +1598,7 @@
           <a:p>
             <a:fld id="{11B134D8-D55D-45EA-8DDC-C1E1F664B674}" type="datetimeFigureOut">
               <a:rPr lang="fr-FR" smtClean="0"/>
-              <a:t>09/03/2019</a:t>
+              <a:t>10/03/2019</a:t>
             </a:fld>
             <a:endParaRPr lang="fr-FR"/>
           </a:p>
@@ -1981,7 +1982,7 @@
           <a:p>
             <a:fld id="{11B134D8-D55D-45EA-8DDC-C1E1F664B674}" type="datetimeFigureOut">
               <a:rPr lang="fr-FR" smtClean="0"/>
-              <a:t>09/03/2019</a:t>
+              <a:t>10/03/2019</a:t>
             </a:fld>
             <a:endParaRPr lang="fr-FR"/>
           </a:p>
@@ -2104,7 +2105,7 @@
           <a:p>
             <a:fld id="{11B134D8-D55D-45EA-8DDC-C1E1F664B674}" type="datetimeFigureOut">
               <a:rPr lang="fr-FR" smtClean="0"/>
-              <a:t>09/03/2019</a:t>
+              <a:t>10/03/2019</a:t>
             </a:fld>
             <a:endParaRPr lang="fr-FR"/>
           </a:p>
@@ -2275,7 +2276,7 @@
           <a:p>
             <a:fld id="{11B134D8-D55D-45EA-8DDC-C1E1F664B674}" type="datetimeFigureOut">
               <a:rPr lang="fr-FR" smtClean="0"/>
-              <a:t>09/03/2019</a:t>
+              <a:t>10/03/2019</a:t>
             </a:fld>
             <a:endParaRPr lang="fr-FR"/>
           </a:p>
@@ -2629,7 +2630,7 @@
           <a:p>
             <a:fld id="{11B134D8-D55D-45EA-8DDC-C1E1F664B674}" type="datetimeFigureOut">
               <a:rPr lang="fr-FR" smtClean="0"/>
-              <a:t>09/03/2019</a:t>
+              <a:t>10/03/2019</a:t>
             </a:fld>
             <a:endParaRPr lang="fr-FR"/>
           </a:p>
@@ -3016,7 +3017,7 @@
           <a:p>
             <a:fld id="{11B134D8-D55D-45EA-8DDC-C1E1F664B674}" type="datetimeFigureOut">
               <a:rPr lang="fr-FR" smtClean="0"/>
-              <a:t>09/03/2019</a:t>
+              <a:t>10/03/2019</a:t>
             </a:fld>
             <a:endParaRPr lang="fr-FR"/>
           </a:p>
@@ -3303,7 +3304,7 @@
           <a:p>
             <a:fld id="{11B134D8-D55D-45EA-8DDC-C1E1F664B674}" type="datetimeFigureOut">
               <a:rPr lang="fr-FR" smtClean="0"/>
-              <a:t>09/03/2019</a:t>
+              <a:t>10/03/2019</a:t>
             </a:fld>
             <a:endParaRPr lang="fr-FR"/>
           </a:p>
@@ -4265,6 +4266,116 @@
 </p:sld>
 </file>
 
+<file path=ppt/slides/slide5.xml><?xml version="1.0" encoding="utf-8"?>
+<p:sld xmlns:a="http://schemas.openxmlformats.org/drawingml/2006/main" xmlns:r="http://schemas.openxmlformats.org/officeDocument/2006/relationships" xmlns:p="http://schemas.openxmlformats.org/presentationml/2006/main">
+  <p:cSld>
+    <p:spTree>
+      <p:nvGrpSpPr>
+        <p:cNvPr id="1" name=""/>
+        <p:cNvGrpSpPr/>
+        <p:nvPr/>
+      </p:nvGrpSpPr>
+      <p:grpSpPr>
+        <a:xfrm>
+          <a:off x="0" y="0"/>
+          <a:ext cx="0" cy="0"/>
+          <a:chOff x="0" y="0"/>
+          <a:chExt cx="0" cy="0"/>
+        </a:xfrm>
+      </p:grpSpPr>
+      <p:sp>
+        <p:nvSpPr>
+          <p:cNvPr id="2" name="Titre 1">
+            <a:extLst>
+              <a:ext uri="{FF2B5EF4-FFF2-40B4-BE49-F238E27FC236}">
+                <a16:creationId xmlns:a16="http://schemas.microsoft.com/office/drawing/2014/main" id="{D0BD1608-3DA7-45B6-BED5-8D1EC63E0095}"/>
+              </a:ext>
+            </a:extLst>
+          </p:cNvPr>
+          <p:cNvSpPr>
+            <a:spLocks noGrp="1"/>
+          </p:cNvSpPr>
+          <p:nvPr>
+            <p:ph type="title"/>
+          </p:nvPr>
+        </p:nvSpPr>
+        <p:spPr/>
+        <p:txBody>
+          <a:bodyPr/>
+          <a:lstStyle/>
+          <a:p>
+            <a:endParaRPr lang="fr-FR"/>
+          </a:p>
+        </p:txBody>
+      </p:sp>
+      <p:sp>
+        <p:nvSpPr>
+          <p:cNvPr id="3" name="Espace réservé du contenu 2">
+            <a:extLst>
+              <a:ext uri="{FF2B5EF4-FFF2-40B4-BE49-F238E27FC236}">
+                <a16:creationId xmlns:a16="http://schemas.microsoft.com/office/drawing/2014/main" id="{978B2C8F-73DC-40D4-A967-880FF1603A8F}"/>
+              </a:ext>
+            </a:extLst>
+          </p:cNvPr>
+          <p:cNvSpPr>
+            <a:spLocks noGrp="1"/>
+          </p:cNvSpPr>
+          <p:nvPr>
+            <p:ph idx="1"/>
+          </p:nvPr>
+        </p:nvSpPr>
+        <p:spPr/>
+        <p:txBody>
+          <a:bodyPr/>
+          <a:lstStyle/>
+          <a:p>
+            <a:endParaRPr lang="fr-FR"/>
+          </a:p>
+        </p:txBody>
+      </p:sp>
+      <p:pic>
+        <p:nvPicPr>
+          <p:cNvPr id="4" name="Image 3">
+            <a:extLst>
+              <a:ext uri="{FF2B5EF4-FFF2-40B4-BE49-F238E27FC236}">
+                <a16:creationId xmlns:a16="http://schemas.microsoft.com/office/drawing/2014/main" id="{A80C4FB4-29BB-468B-AD16-7C90F69EC808}"/>
+              </a:ext>
+            </a:extLst>
+          </p:cNvPr>
+          <p:cNvPicPr>
+            <a:picLocks noChangeAspect="1"/>
+          </p:cNvPicPr>
+          <p:nvPr/>
+        </p:nvPicPr>
+        <p:blipFill>
+          <a:blip r:embed="rId2"/>
+          <a:stretch>
+            <a:fillRect/>
+          </a:stretch>
+        </p:blipFill>
+        <p:spPr>
+          <a:xfrm>
+            <a:off x="3906975" y="1249441"/>
+            <a:ext cx="4378050" cy="4359117"/>
+          </a:xfrm>
+          <a:prstGeom prst="rect">
+            <a:avLst/>
+          </a:prstGeom>
+        </p:spPr>
+      </p:pic>
+    </p:spTree>
+    <p:extLst>
+      <p:ext uri="{BB962C8B-B14F-4D97-AF65-F5344CB8AC3E}">
+        <p14:creationId xmlns:p14="http://schemas.microsoft.com/office/powerpoint/2010/main" val="1383163953"/>
+      </p:ext>
+    </p:extLst>
+  </p:cSld>
+  <p:clrMapOvr>
+    <a:masterClrMapping/>
+  </p:clrMapOvr>
+</p:sld>
+</file>
+
 <file path=ppt/theme/theme1.xml><?xml version="1.0" encoding="utf-8"?>
 <a:theme xmlns:a="http://schemas.openxmlformats.org/drawingml/2006/main" name="Rétrospective">
   <a:themeElements>

</xml_diff>

<commit_message>
Added a readme and a video link to youtube
</commit_message>
<xml_diff>
--- a/CommandLineParser/Exercice CommandLineParser.pptx
+++ b/CommandLineParser/Exercice CommandLineParser.pptx
@@ -2,8 +2,11 @@
 <file path=ppt/presentation.xml><?xml version="1.0" encoding="utf-8"?>
 <p:presentation xmlns:a="http://schemas.openxmlformats.org/drawingml/2006/main" xmlns:r="http://schemas.openxmlformats.org/officeDocument/2006/relationships" xmlns:p="http://schemas.openxmlformats.org/presentationml/2006/main" saveSubsetFonts="1">
   <p:sldMasterIdLst>
-    <p:sldMasterId id="2147484098" r:id="rId1"/>
+    <p:sldMasterId id="2147484337" r:id="rId1"/>
   </p:sldMasterIdLst>
+  <p:notesMasterIdLst>
+    <p:notesMasterId r:id="rId7"/>
+  </p:notesMasterIdLst>
   <p:sldIdLst>
     <p:sldId id="256" r:id="rId2"/>
     <p:sldId id="257" r:id="rId3"/>
@@ -17,7 +20,7 @@
     <a:defPPr>
       <a:defRPr lang="en-US"/>
     </a:defPPr>
-    <a:lvl1pPr marL="0" algn="l" defTabSz="457200" rtl="0" eaLnBrk="1" latinLnBrk="0" hangingPunct="1">
+    <a:lvl1pPr marL="0" algn="l" defTabSz="914400" rtl="0" eaLnBrk="1" latinLnBrk="0" hangingPunct="1">
       <a:defRPr sz="1800" kern="1200">
         <a:solidFill>
           <a:schemeClr val="tx1"/>
@@ -27,7 +30,7 @@
         <a:cs typeface="+mn-cs"/>
       </a:defRPr>
     </a:lvl1pPr>
-    <a:lvl2pPr marL="457200" algn="l" defTabSz="457200" rtl="0" eaLnBrk="1" latinLnBrk="0" hangingPunct="1">
+    <a:lvl2pPr marL="457200" algn="l" defTabSz="914400" rtl="0" eaLnBrk="1" latinLnBrk="0" hangingPunct="1">
       <a:defRPr sz="1800" kern="1200">
         <a:solidFill>
           <a:schemeClr val="tx1"/>
@@ -37,7 +40,7 @@
         <a:cs typeface="+mn-cs"/>
       </a:defRPr>
     </a:lvl2pPr>
-    <a:lvl3pPr marL="914400" algn="l" defTabSz="457200" rtl="0" eaLnBrk="1" latinLnBrk="0" hangingPunct="1">
+    <a:lvl3pPr marL="914400" algn="l" defTabSz="914400" rtl="0" eaLnBrk="1" latinLnBrk="0" hangingPunct="1">
       <a:defRPr sz="1800" kern="1200">
         <a:solidFill>
           <a:schemeClr val="tx1"/>
@@ -47,7 +50,7 @@
         <a:cs typeface="+mn-cs"/>
       </a:defRPr>
     </a:lvl3pPr>
-    <a:lvl4pPr marL="1371600" algn="l" defTabSz="457200" rtl="0" eaLnBrk="1" latinLnBrk="0" hangingPunct="1">
+    <a:lvl4pPr marL="1371600" algn="l" defTabSz="914400" rtl="0" eaLnBrk="1" latinLnBrk="0" hangingPunct="1">
       <a:defRPr sz="1800" kern="1200">
         <a:solidFill>
           <a:schemeClr val="tx1"/>
@@ -57,7 +60,7 @@
         <a:cs typeface="+mn-cs"/>
       </a:defRPr>
     </a:lvl4pPr>
-    <a:lvl5pPr marL="1828800" algn="l" defTabSz="457200" rtl="0" eaLnBrk="1" latinLnBrk="0" hangingPunct="1">
+    <a:lvl5pPr marL="1828800" algn="l" defTabSz="914400" rtl="0" eaLnBrk="1" latinLnBrk="0" hangingPunct="1">
       <a:defRPr sz="1800" kern="1200">
         <a:solidFill>
           <a:schemeClr val="tx1"/>
@@ -67,7 +70,7 @@
         <a:cs typeface="+mn-cs"/>
       </a:defRPr>
     </a:lvl5pPr>
-    <a:lvl6pPr marL="2286000" algn="l" defTabSz="457200" rtl="0" eaLnBrk="1" latinLnBrk="0" hangingPunct="1">
+    <a:lvl6pPr marL="2286000" algn="l" defTabSz="914400" rtl="0" eaLnBrk="1" latinLnBrk="0" hangingPunct="1">
       <a:defRPr sz="1800" kern="1200">
         <a:solidFill>
           <a:schemeClr val="tx1"/>
@@ -77,7 +80,7 @@
         <a:cs typeface="+mn-cs"/>
       </a:defRPr>
     </a:lvl6pPr>
-    <a:lvl7pPr marL="2743200" algn="l" defTabSz="457200" rtl="0" eaLnBrk="1" latinLnBrk="0" hangingPunct="1">
+    <a:lvl7pPr marL="2743200" algn="l" defTabSz="914400" rtl="0" eaLnBrk="1" latinLnBrk="0" hangingPunct="1">
       <a:defRPr sz="1800" kern="1200">
         <a:solidFill>
           <a:schemeClr val="tx1"/>
@@ -87,7 +90,7 @@
         <a:cs typeface="+mn-cs"/>
       </a:defRPr>
     </a:lvl7pPr>
-    <a:lvl8pPr marL="3200400" algn="l" defTabSz="457200" rtl="0" eaLnBrk="1" latinLnBrk="0" hangingPunct="1">
+    <a:lvl8pPr marL="3200400" algn="l" defTabSz="914400" rtl="0" eaLnBrk="1" latinLnBrk="0" hangingPunct="1">
       <a:defRPr sz="1800" kern="1200">
         <a:solidFill>
           <a:schemeClr val="tx1"/>
@@ -97,7 +100,7 @@
         <a:cs typeface="+mn-cs"/>
       </a:defRPr>
     </a:lvl8pPr>
-    <a:lvl9pPr marL="3657600" algn="l" defTabSz="457200" rtl="0" eaLnBrk="1" latinLnBrk="0" hangingPunct="1">
+    <a:lvl9pPr marL="3657600" algn="l" defTabSz="914400" rtl="0" eaLnBrk="1" latinLnBrk="0" hangingPunct="1">
       <a:defRPr sz="1800" kern="1200">
         <a:solidFill>
           <a:schemeClr val="tx1"/>
@@ -114,6 +117,1685 @@
     </p:ext>
   </p:extLst>
 </p:presentation>
+</file>
+
+<file path=ppt/notesMasters/notesMaster1.xml><?xml version="1.0" encoding="utf-8"?>
+<p:notesMaster xmlns:a="http://schemas.openxmlformats.org/drawingml/2006/main" xmlns:r="http://schemas.openxmlformats.org/officeDocument/2006/relationships" xmlns:p="http://schemas.openxmlformats.org/presentationml/2006/main">
+  <p:cSld>
+    <p:bg>
+      <p:bgRef idx="1001">
+        <a:schemeClr val="bg1"/>
+      </p:bgRef>
+    </p:bg>
+    <p:spTree>
+      <p:nvGrpSpPr>
+        <p:cNvPr id="1" name=""/>
+        <p:cNvGrpSpPr/>
+        <p:nvPr/>
+      </p:nvGrpSpPr>
+      <p:grpSpPr>
+        <a:xfrm>
+          <a:off x="0" y="0"/>
+          <a:ext cx="0" cy="0"/>
+          <a:chOff x="0" y="0"/>
+          <a:chExt cx="0" cy="0"/>
+        </a:xfrm>
+      </p:grpSpPr>
+      <p:sp>
+        <p:nvSpPr>
+          <p:cNvPr id="2" name="Espace réservé de l'en-tête 1"/>
+          <p:cNvSpPr>
+            <a:spLocks noGrp="1"/>
+          </p:cNvSpPr>
+          <p:nvPr>
+            <p:ph type="hdr" sz="quarter"/>
+          </p:nvPr>
+        </p:nvSpPr>
+        <p:spPr>
+          <a:xfrm>
+            <a:off x="0" y="0"/>
+            <a:ext cx="2971800" cy="458788"/>
+          </a:xfrm>
+          <a:prstGeom prst="rect">
+            <a:avLst/>
+          </a:prstGeom>
+        </p:spPr>
+        <p:txBody>
+          <a:bodyPr vert="horz" lIns="91440" tIns="45720" rIns="91440" bIns="45720" rtlCol="0"/>
+          <a:lstStyle>
+            <a:lvl1pPr algn="l">
+              <a:defRPr sz="1200"/>
+            </a:lvl1pPr>
+          </a:lstStyle>
+          <a:p>
+            <a:endParaRPr lang="fr-FR"/>
+          </a:p>
+        </p:txBody>
+      </p:sp>
+      <p:sp>
+        <p:nvSpPr>
+          <p:cNvPr id="3" name="Espace réservé de la date 2"/>
+          <p:cNvSpPr>
+            <a:spLocks noGrp="1"/>
+          </p:cNvSpPr>
+          <p:nvPr>
+            <p:ph type="dt" idx="1"/>
+          </p:nvPr>
+        </p:nvSpPr>
+        <p:spPr>
+          <a:xfrm>
+            <a:off x="3884613" y="0"/>
+            <a:ext cx="2971800" cy="458788"/>
+          </a:xfrm>
+          <a:prstGeom prst="rect">
+            <a:avLst/>
+          </a:prstGeom>
+        </p:spPr>
+        <p:txBody>
+          <a:bodyPr vert="horz" lIns="91440" tIns="45720" rIns="91440" bIns="45720" rtlCol="0"/>
+          <a:lstStyle>
+            <a:lvl1pPr algn="r">
+              <a:defRPr sz="1200"/>
+            </a:lvl1pPr>
+          </a:lstStyle>
+          <a:p>
+            <a:fld id="{AE1639D1-751E-4B7F-87C6-1F6CE7877CC7}" type="datetimeFigureOut">
+              <a:rPr lang="fr-FR" smtClean="0"/>
+              <a:t>12/09/2020</a:t>
+            </a:fld>
+            <a:endParaRPr lang="fr-FR"/>
+          </a:p>
+        </p:txBody>
+      </p:sp>
+      <p:sp>
+        <p:nvSpPr>
+          <p:cNvPr id="4" name="Espace réservé de l'image des diapositives 3"/>
+          <p:cNvSpPr>
+            <a:spLocks noGrp="1" noRot="1" noChangeAspect="1"/>
+          </p:cNvSpPr>
+          <p:nvPr>
+            <p:ph type="sldImg" idx="2"/>
+          </p:nvPr>
+        </p:nvSpPr>
+        <p:spPr>
+          <a:xfrm>
+            <a:off x="685800" y="1143000"/>
+            <a:ext cx="5486400" cy="3086100"/>
+          </a:xfrm>
+          <a:prstGeom prst="rect">
+            <a:avLst/>
+          </a:prstGeom>
+          <a:noFill/>
+          <a:ln w="12700">
+            <a:solidFill>
+              <a:prstClr val="black"/>
+            </a:solidFill>
+          </a:ln>
+        </p:spPr>
+        <p:txBody>
+          <a:bodyPr vert="horz" lIns="91440" tIns="45720" rIns="91440" bIns="45720" rtlCol="0" anchor="ctr"/>
+          <a:lstStyle/>
+          <a:p>
+            <a:endParaRPr lang="fr-FR"/>
+          </a:p>
+        </p:txBody>
+      </p:sp>
+      <p:sp>
+        <p:nvSpPr>
+          <p:cNvPr id="5" name="Espace réservé des notes 4"/>
+          <p:cNvSpPr>
+            <a:spLocks noGrp="1"/>
+          </p:cNvSpPr>
+          <p:nvPr>
+            <p:ph type="body" sz="quarter" idx="3"/>
+          </p:nvPr>
+        </p:nvSpPr>
+        <p:spPr>
+          <a:xfrm>
+            <a:off x="685800" y="4400550"/>
+            <a:ext cx="5486400" cy="3600450"/>
+          </a:xfrm>
+          <a:prstGeom prst="rect">
+            <a:avLst/>
+          </a:prstGeom>
+        </p:spPr>
+        <p:txBody>
+          <a:bodyPr vert="horz" lIns="91440" tIns="45720" rIns="91440" bIns="45720" rtlCol="0"/>
+          <a:lstStyle/>
+          <a:p>
+            <a:pPr lvl="0"/>
+            <a:r>
+              <a:rPr lang="fr-FR"/>
+              <a:t>Cliquez pour modifier les styles du texte du masque</a:t>
+            </a:r>
+          </a:p>
+          <a:p>
+            <a:pPr lvl="1"/>
+            <a:r>
+              <a:rPr lang="fr-FR"/>
+              <a:t>Deuxième niveau</a:t>
+            </a:r>
+          </a:p>
+          <a:p>
+            <a:pPr lvl="2"/>
+            <a:r>
+              <a:rPr lang="fr-FR"/>
+              <a:t>Troisième niveau</a:t>
+            </a:r>
+          </a:p>
+          <a:p>
+            <a:pPr lvl="3"/>
+            <a:r>
+              <a:rPr lang="fr-FR"/>
+              <a:t>Quatrième niveau</a:t>
+            </a:r>
+          </a:p>
+          <a:p>
+            <a:pPr lvl="4"/>
+            <a:r>
+              <a:rPr lang="fr-FR"/>
+              <a:t>Cinquième niveau</a:t>
+            </a:r>
+          </a:p>
+        </p:txBody>
+      </p:sp>
+      <p:sp>
+        <p:nvSpPr>
+          <p:cNvPr id="6" name="Espace réservé du pied de page 5"/>
+          <p:cNvSpPr>
+            <a:spLocks noGrp="1"/>
+          </p:cNvSpPr>
+          <p:nvPr>
+            <p:ph type="ftr" sz="quarter" idx="4"/>
+          </p:nvPr>
+        </p:nvSpPr>
+        <p:spPr>
+          <a:xfrm>
+            <a:off x="0" y="8685213"/>
+            <a:ext cx="2971800" cy="458787"/>
+          </a:xfrm>
+          <a:prstGeom prst="rect">
+            <a:avLst/>
+          </a:prstGeom>
+        </p:spPr>
+        <p:txBody>
+          <a:bodyPr vert="horz" lIns="91440" tIns="45720" rIns="91440" bIns="45720" rtlCol="0" anchor="b"/>
+          <a:lstStyle>
+            <a:lvl1pPr algn="l">
+              <a:defRPr sz="1200"/>
+            </a:lvl1pPr>
+          </a:lstStyle>
+          <a:p>
+            <a:endParaRPr lang="fr-FR"/>
+          </a:p>
+        </p:txBody>
+      </p:sp>
+      <p:sp>
+        <p:nvSpPr>
+          <p:cNvPr id="7" name="Espace réservé du numéro de diapositive 6"/>
+          <p:cNvSpPr>
+            <a:spLocks noGrp="1"/>
+          </p:cNvSpPr>
+          <p:nvPr>
+            <p:ph type="sldNum" sz="quarter" idx="5"/>
+          </p:nvPr>
+        </p:nvSpPr>
+        <p:spPr>
+          <a:xfrm>
+            <a:off x="3884613" y="8685213"/>
+            <a:ext cx="2971800" cy="458787"/>
+          </a:xfrm>
+          <a:prstGeom prst="rect">
+            <a:avLst/>
+          </a:prstGeom>
+        </p:spPr>
+        <p:txBody>
+          <a:bodyPr vert="horz" lIns="91440" tIns="45720" rIns="91440" bIns="45720" rtlCol="0" anchor="b"/>
+          <a:lstStyle>
+            <a:lvl1pPr algn="r">
+              <a:defRPr sz="1200"/>
+            </a:lvl1pPr>
+          </a:lstStyle>
+          <a:p>
+            <a:fld id="{06C65CB2-F9C5-48FF-A234-0BD63FBDD1F2}" type="slidenum">
+              <a:rPr lang="fr-FR" smtClean="0"/>
+              <a:t>‹N°›</a:t>
+            </a:fld>
+            <a:endParaRPr lang="fr-FR"/>
+          </a:p>
+        </p:txBody>
+      </p:sp>
+    </p:spTree>
+    <p:extLst>
+      <p:ext uri="{BB962C8B-B14F-4D97-AF65-F5344CB8AC3E}">
+        <p14:creationId xmlns:p14="http://schemas.microsoft.com/office/powerpoint/2010/main" val="2048575465"/>
+      </p:ext>
+    </p:extLst>
+  </p:cSld>
+  <p:clrMap bg1="lt1" tx1="dk1" bg2="lt2" tx2="dk2" accent1="accent1" accent2="accent2" accent3="accent3" accent4="accent4" accent5="accent5" accent6="accent6" hlink="hlink" folHlink="folHlink"/>
+  <p:notesStyle>
+    <a:lvl1pPr marL="0" algn="l" defTabSz="914400" rtl="0" eaLnBrk="1" latinLnBrk="0" hangingPunct="1">
+      <a:defRPr sz="1200" kern="1200">
+        <a:solidFill>
+          <a:schemeClr val="tx1"/>
+        </a:solidFill>
+        <a:latin typeface="+mn-lt"/>
+        <a:ea typeface="+mn-ea"/>
+        <a:cs typeface="+mn-cs"/>
+      </a:defRPr>
+    </a:lvl1pPr>
+    <a:lvl2pPr marL="457200" algn="l" defTabSz="914400" rtl="0" eaLnBrk="1" latinLnBrk="0" hangingPunct="1">
+      <a:defRPr sz="1200" kern="1200">
+        <a:solidFill>
+          <a:schemeClr val="tx1"/>
+        </a:solidFill>
+        <a:latin typeface="+mn-lt"/>
+        <a:ea typeface="+mn-ea"/>
+        <a:cs typeface="+mn-cs"/>
+      </a:defRPr>
+    </a:lvl2pPr>
+    <a:lvl3pPr marL="914400" algn="l" defTabSz="914400" rtl="0" eaLnBrk="1" latinLnBrk="0" hangingPunct="1">
+      <a:defRPr sz="1200" kern="1200">
+        <a:solidFill>
+          <a:schemeClr val="tx1"/>
+        </a:solidFill>
+        <a:latin typeface="+mn-lt"/>
+        <a:ea typeface="+mn-ea"/>
+        <a:cs typeface="+mn-cs"/>
+      </a:defRPr>
+    </a:lvl3pPr>
+    <a:lvl4pPr marL="1371600" algn="l" defTabSz="914400" rtl="0" eaLnBrk="1" latinLnBrk="0" hangingPunct="1">
+      <a:defRPr sz="1200" kern="1200">
+        <a:solidFill>
+          <a:schemeClr val="tx1"/>
+        </a:solidFill>
+        <a:latin typeface="+mn-lt"/>
+        <a:ea typeface="+mn-ea"/>
+        <a:cs typeface="+mn-cs"/>
+      </a:defRPr>
+    </a:lvl4pPr>
+    <a:lvl5pPr marL="1828800" algn="l" defTabSz="914400" rtl="0" eaLnBrk="1" latinLnBrk="0" hangingPunct="1">
+      <a:defRPr sz="1200" kern="1200">
+        <a:solidFill>
+          <a:schemeClr val="tx1"/>
+        </a:solidFill>
+        <a:latin typeface="+mn-lt"/>
+        <a:ea typeface="+mn-ea"/>
+        <a:cs typeface="+mn-cs"/>
+      </a:defRPr>
+    </a:lvl5pPr>
+    <a:lvl6pPr marL="2286000" algn="l" defTabSz="914400" rtl="0" eaLnBrk="1" latinLnBrk="0" hangingPunct="1">
+      <a:defRPr sz="1200" kern="1200">
+        <a:solidFill>
+          <a:schemeClr val="tx1"/>
+        </a:solidFill>
+        <a:latin typeface="+mn-lt"/>
+        <a:ea typeface="+mn-ea"/>
+        <a:cs typeface="+mn-cs"/>
+      </a:defRPr>
+    </a:lvl6pPr>
+    <a:lvl7pPr marL="2743200" algn="l" defTabSz="914400" rtl="0" eaLnBrk="1" latinLnBrk="0" hangingPunct="1">
+      <a:defRPr sz="1200" kern="1200">
+        <a:solidFill>
+          <a:schemeClr val="tx1"/>
+        </a:solidFill>
+        <a:latin typeface="+mn-lt"/>
+        <a:ea typeface="+mn-ea"/>
+        <a:cs typeface="+mn-cs"/>
+      </a:defRPr>
+    </a:lvl7pPr>
+    <a:lvl8pPr marL="3200400" algn="l" defTabSz="914400" rtl="0" eaLnBrk="1" latinLnBrk="0" hangingPunct="1">
+      <a:defRPr sz="1200" kern="1200">
+        <a:solidFill>
+          <a:schemeClr val="tx1"/>
+        </a:solidFill>
+        <a:latin typeface="+mn-lt"/>
+        <a:ea typeface="+mn-ea"/>
+        <a:cs typeface="+mn-cs"/>
+      </a:defRPr>
+    </a:lvl8pPr>
+    <a:lvl9pPr marL="3657600" algn="l" defTabSz="914400" rtl="0" eaLnBrk="1" latinLnBrk="0" hangingPunct="1">
+      <a:defRPr sz="1200" kern="1200">
+        <a:solidFill>
+          <a:schemeClr val="tx1"/>
+        </a:solidFill>
+        <a:latin typeface="+mn-lt"/>
+        <a:ea typeface="+mn-ea"/>
+        <a:cs typeface="+mn-cs"/>
+      </a:defRPr>
+    </a:lvl9pPr>
+  </p:notesStyle>
+</p:notesMaster>
+</file>
+
+<file path=ppt/notesSlides/notesSlide1.xml><?xml version="1.0" encoding="utf-8"?>
+<p:notes xmlns:a="http://schemas.openxmlformats.org/drawingml/2006/main" xmlns:r="http://schemas.openxmlformats.org/officeDocument/2006/relationships" xmlns:p="http://schemas.openxmlformats.org/presentationml/2006/main">
+  <p:cSld>
+    <p:spTree>
+      <p:nvGrpSpPr>
+        <p:cNvPr id="1" name=""/>
+        <p:cNvGrpSpPr/>
+        <p:nvPr/>
+      </p:nvGrpSpPr>
+      <p:grpSpPr>
+        <a:xfrm>
+          <a:off x="0" y="0"/>
+          <a:ext cx="0" cy="0"/>
+          <a:chOff x="0" y="0"/>
+          <a:chExt cx="0" cy="0"/>
+        </a:xfrm>
+      </p:grpSpPr>
+      <p:sp>
+        <p:nvSpPr>
+          <p:cNvPr id="2" name="Espace réservé de l'image des diapositives 1"/>
+          <p:cNvSpPr>
+            <a:spLocks noGrp="1" noRot="1" noChangeAspect="1"/>
+          </p:cNvSpPr>
+          <p:nvPr>
+            <p:ph type="sldImg"/>
+          </p:nvPr>
+        </p:nvSpPr>
+        <p:spPr/>
+      </p:sp>
+      <p:sp>
+        <p:nvSpPr>
+          <p:cNvPr id="3" name="Espace réservé des notes 2"/>
+          <p:cNvSpPr>
+            <a:spLocks noGrp="1"/>
+          </p:cNvSpPr>
+          <p:nvPr>
+            <p:ph type="body" idx="1"/>
+          </p:nvPr>
+        </p:nvSpPr>
+        <p:spPr/>
+        <p:txBody>
+          <a:bodyPr/>
+          <a:lstStyle/>
+          <a:p>
+            <a:r>
+              <a:rPr lang="fr-FR" sz="1800" dirty="0">
+                <a:effectLst/>
+                <a:latin typeface="Calibri" panose="020F0502020204030204" pitchFamily="34" charset="0"/>
+                <a:ea typeface="Calibri" panose="020F0502020204030204" pitchFamily="34" charset="0"/>
+                <a:cs typeface="Times New Roman" panose="02020603050405020304" pitchFamily="18" charset="0"/>
+              </a:rPr>
+              <a:t>Et bonjour,</a:t>
+            </a:r>
+          </a:p>
+          <a:p>
+            <a:r>
+              <a:rPr lang="fr-FR" sz="1800" dirty="0">
+                <a:effectLst/>
+                <a:latin typeface="Calibri" panose="020F0502020204030204" pitchFamily="34" charset="0"/>
+                <a:ea typeface="Calibri" panose="020F0502020204030204" pitchFamily="34" charset="0"/>
+                <a:cs typeface="Times New Roman" panose="02020603050405020304" pitchFamily="18" charset="0"/>
+              </a:rPr>
+              <a:t>Bienvenue sur cet exercice </a:t>
+            </a:r>
+            <a:r>
+              <a:rPr lang="fr-FR" sz="1800" dirty="0" err="1">
+                <a:effectLst/>
+                <a:latin typeface="Calibri" panose="020F0502020204030204" pitchFamily="34" charset="0"/>
+                <a:ea typeface="Calibri" panose="020F0502020204030204" pitchFamily="34" charset="0"/>
+                <a:cs typeface="Times New Roman" panose="02020603050405020304" pitchFamily="18" charset="0"/>
+              </a:rPr>
+              <a:t>CommandLineParser</a:t>
+            </a:r>
+            <a:r>
+              <a:rPr lang="fr-FR" sz="1800" dirty="0">
+                <a:effectLst/>
+                <a:latin typeface="Calibri" panose="020F0502020204030204" pitchFamily="34" charset="0"/>
+                <a:ea typeface="Calibri" panose="020F0502020204030204" pitchFamily="34" charset="0"/>
+                <a:cs typeface="Times New Roman" panose="02020603050405020304" pitchFamily="18" charset="0"/>
+              </a:rPr>
+              <a:t>. Je m’appelle Jean-Pierre Planas, je suis formateur certifié Microsoft, et je vais vous présenter par cette vidéo l’exercice </a:t>
+            </a:r>
+            <a:r>
+              <a:rPr lang="fr-FR" sz="1800" dirty="0" err="1">
+                <a:effectLst/>
+                <a:latin typeface="Calibri" panose="020F0502020204030204" pitchFamily="34" charset="0"/>
+                <a:ea typeface="Calibri" panose="020F0502020204030204" pitchFamily="34" charset="0"/>
+                <a:cs typeface="Times New Roman" panose="02020603050405020304" pitchFamily="18" charset="0"/>
+              </a:rPr>
+              <a:t>CommandLineParser</a:t>
+            </a:r>
+            <a:r>
+              <a:rPr lang="fr-FR" sz="1800" dirty="0">
+                <a:effectLst/>
+                <a:latin typeface="Calibri" panose="020F0502020204030204" pitchFamily="34" charset="0"/>
+                <a:ea typeface="Calibri" panose="020F0502020204030204" pitchFamily="34" charset="0"/>
+                <a:cs typeface="Times New Roman" panose="02020603050405020304" pitchFamily="18" charset="0"/>
+              </a:rPr>
+              <a:t> que j’ai conçu, inspiré d’un vrai besoin professionnel. Cet exercice fait partie de la formation « Programmez avec C# ».</a:t>
+            </a:r>
+          </a:p>
+          <a:p>
+            <a:r>
+              <a:rPr lang="fr-FR" sz="1800" dirty="0">
+                <a:effectLst/>
+                <a:latin typeface="Calibri" panose="020F0502020204030204" pitchFamily="34" charset="0"/>
+                <a:ea typeface="Calibri" panose="020F0502020204030204" pitchFamily="34" charset="0"/>
+                <a:cs typeface="Times New Roman" panose="02020603050405020304" pitchFamily="18" charset="0"/>
+              </a:rPr>
+              <a:t>Cet exercice va vous permettre de mettre en pratique certains concepts C# parmi lesquels :</a:t>
+            </a:r>
+          </a:p>
+          <a:p>
+            <a:pPr marL="342900" lvl="0" indent="-342900">
+              <a:buFont typeface="Calibri" panose="020F0502020204030204" pitchFamily="34" charset="0"/>
+              <a:buChar char="-"/>
+              <a:tabLst>
+                <a:tab pos="457200" algn="l"/>
+              </a:tabLst>
+            </a:pPr>
+            <a:r>
+              <a:rPr lang="fr-FR" sz="1800" dirty="0">
+                <a:effectLst/>
+                <a:latin typeface="Calibri" panose="020F0502020204030204" pitchFamily="34" charset="0"/>
+                <a:ea typeface="Calibri" panose="020F0502020204030204" pitchFamily="34" charset="0"/>
+                <a:cs typeface="Times New Roman" panose="02020603050405020304" pitchFamily="18" charset="0"/>
+              </a:rPr>
+              <a:t>La réflexion (parfois appelée introspection). La réflexion permet de découvrir des types, et d’invoquer leurs membres à l’exécution.</a:t>
+            </a:r>
+          </a:p>
+          <a:p>
+            <a:pPr marL="342900" lvl="0" indent="-342900">
+              <a:buFont typeface="Calibri" panose="020F0502020204030204" pitchFamily="34" charset="0"/>
+              <a:buChar char="-"/>
+              <a:tabLst>
+                <a:tab pos="457200" algn="l"/>
+              </a:tabLst>
+            </a:pPr>
+            <a:r>
+              <a:rPr lang="fr-FR" sz="1800" dirty="0">
+                <a:effectLst/>
+                <a:latin typeface="Calibri" panose="020F0502020204030204" pitchFamily="34" charset="0"/>
+                <a:ea typeface="Calibri" panose="020F0502020204030204" pitchFamily="34" charset="0"/>
+                <a:cs typeface="Times New Roman" panose="02020603050405020304" pitchFamily="18" charset="0"/>
+              </a:rPr>
+              <a:t>Les attributs C#. Les attributs en C# sont de parfaite illustration du design pattern décorateur</a:t>
+            </a:r>
+          </a:p>
+          <a:p>
+            <a:pPr marL="342900" lvl="0" indent="-342900">
+              <a:buFont typeface="Calibri" panose="020F0502020204030204" pitchFamily="34" charset="0"/>
+              <a:buChar char="-"/>
+              <a:tabLst>
+                <a:tab pos="457200" algn="l"/>
+              </a:tabLst>
+            </a:pPr>
+            <a:r>
+              <a:rPr lang="fr-FR" sz="1800" dirty="0">
+                <a:effectLst/>
+                <a:latin typeface="Calibri" panose="020F0502020204030204" pitchFamily="34" charset="0"/>
+                <a:ea typeface="Calibri" panose="020F0502020204030204" pitchFamily="34" charset="0"/>
+                <a:cs typeface="Times New Roman" panose="02020603050405020304" pitchFamily="18" charset="0"/>
+              </a:rPr>
+              <a:t>Les types génériques. Ils permettent de créer des classes génériques. Ces classes vont pouvoir être facilement réutilisée tout en restant fortement typées, et de bénéficier du contrôle de type à la compilation. Renforcé par les contraintes, ce contrôle devient puissant.</a:t>
+            </a:r>
+          </a:p>
+          <a:p>
+            <a:pPr marL="342900" lvl="0" indent="-342900">
+              <a:buFont typeface="Calibri" panose="020F0502020204030204" pitchFamily="34" charset="0"/>
+              <a:buChar char="-"/>
+              <a:tabLst>
+                <a:tab pos="457200" algn="l"/>
+              </a:tabLst>
+            </a:pPr>
+            <a:r>
+              <a:rPr lang="fr-FR" sz="1800" dirty="0">
+                <a:effectLst/>
+                <a:latin typeface="Calibri" panose="020F0502020204030204" pitchFamily="34" charset="0"/>
+                <a:ea typeface="Calibri" panose="020F0502020204030204" pitchFamily="34" charset="0"/>
+                <a:cs typeface="Times New Roman" panose="02020603050405020304" pitchFamily="18" charset="0"/>
+              </a:rPr>
+              <a:t>Et pour finir, d’une manière générale, l’idée de cet exercice est de vous permettre de vous exercer sur vos capacités d’abstraction.</a:t>
+            </a:r>
+          </a:p>
+          <a:p>
+            <a:r>
+              <a:rPr lang="fr-FR" sz="1800" dirty="0">
+                <a:effectLst/>
+                <a:latin typeface="Calibri" panose="020F0502020204030204" pitchFamily="34" charset="0"/>
+                <a:ea typeface="Calibri" panose="020F0502020204030204" pitchFamily="34" charset="0"/>
+                <a:cs typeface="Times New Roman" panose="02020603050405020304" pitchFamily="18" charset="0"/>
+              </a:rPr>
+              <a:t> </a:t>
+            </a:r>
+          </a:p>
+          <a:p>
+            <a:r>
+              <a:rPr lang="fr-FR" sz="1800" dirty="0">
+                <a:effectLst/>
+                <a:latin typeface="Calibri" panose="020F0502020204030204" pitchFamily="34" charset="0"/>
+                <a:ea typeface="Calibri" panose="020F0502020204030204" pitchFamily="34" charset="0"/>
+                <a:cs typeface="Times New Roman" panose="02020603050405020304" pitchFamily="18" charset="0"/>
+              </a:rPr>
+              <a:t>Mais avant de continuer, j’ai une question technique à vous poser, qui est essentielle pour que vous puissiez réaliser cet exercice correctement :</a:t>
+            </a:r>
+          </a:p>
+          <a:p>
+            <a:r>
+              <a:rPr lang="fr-FR" sz="1800" dirty="0">
+                <a:effectLst/>
+                <a:latin typeface="Calibri" panose="020F0502020204030204" pitchFamily="34" charset="0"/>
+                <a:ea typeface="Calibri" panose="020F0502020204030204" pitchFamily="34" charset="0"/>
+                <a:cs typeface="Times New Roman" panose="02020603050405020304" pitchFamily="18" charset="0"/>
+              </a:rPr>
+              <a:t>Quelle est la différence et le point commun entre le mot clé </a:t>
+            </a:r>
+            <a:r>
+              <a:rPr lang="fr-FR" sz="1800" dirty="0" err="1">
+                <a:effectLst/>
+                <a:latin typeface="Calibri" panose="020F0502020204030204" pitchFamily="34" charset="0"/>
+                <a:ea typeface="Calibri" panose="020F0502020204030204" pitchFamily="34" charset="0"/>
+                <a:cs typeface="Times New Roman" panose="02020603050405020304" pitchFamily="18" charset="0"/>
+              </a:rPr>
+              <a:t>typeof</a:t>
+            </a:r>
+            <a:r>
+              <a:rPr lang="fr-FR" sz="1800" dirty="0">
+                <a:effectLst/>
+                <a:latin typeface="Calibri" panose="020F0502020204030204" pitchFamily="34" charset="0"/>
+                <a:ea typeface="Calibri" panose="020F0502020204030204" pitchFamily="34" charset="0"/>
+                <a:cs typeface="Times New Roman" panose="02020603050405020304" pitchFamily="18" charset="0"/>
+              </a:rPr>
+              <a:t> ? et la méthode </a:t>
+            </a:r>
+            <a:r>
+              <a:rPr lang="fr-FR" sz="1800" dirty="0" err="1">
+                <a:effectLst/>
+                <a:latin typeface="Calibri" panose="020F0502020204030204" pitchFamily="34" charset="0"/>
+                <a:ea typeface="Calibri" panose="020F0502020204030204" pitchFamily="34" charset="0"/>
+                <a:cs typeface="Times New Roman" panose="02020603050405020304" pitchFamily="18" charset="0"/>
+              </a:rPr>
+              <a:t>GetType</a:t>
+            </a:r>
+            <a:r>
+              <a:rPr lang="fr-FR" sz="1800" dirty="0">
+                <a:effectLst/>
+                <a:latin typeface="Calibri" panose="020F0502020204030204" pitchFamily="34" charset="0"/>
+                <a:ea typeface="Calibri" panose="020F0502020204030204" pitchFamily="34" charset="0"/>
+                <a:cs typeface="Times New Roman" panose="02020603050405020304" pitchFamily="18" charset="0"/>
+              </a:rPr>
+              <a:t>() ?</a:t>
+            </a:r>
+          </a:p>
+          <a:p>
+            <a:r>
+              <a:rPr lang="fr-FR" sz="1800" dirty="0">
+                <a:effectLst/>
+                <a:latin typeface="Calibri" panose="020F0502020204030204" pitchFamily="34" charset="0"/>
+                <a:ea typeface="Calibri" panose="020F0502020204030204" pitchFamily="34" charset="0"/>
+                <a:cs typeface="Times New Roman" panose="02020603050405020304" pitchFamily="18" charset="0"/>
+              </a:rPr>
+              <a:t>Je vous invite à mettre cette vidéo en pause, afin de réfléchir ou de chercher par vous-même, avant que je ne vous donne la réponse.</a:t>
+            </a:r>
+          </a:p>
+          <a:p>
+            <a:r>
+              <a:rPr lang="fr-FR" sz="1800" dirty="0">
+                <a:effectLst/>
+                <a:latin typeface="Calibri" panose="020F0502020204030204" pitchFamily="34" charset="0"/>
+                <a:ea typeface="Calibri" panose="020F0502020204030204" pitchFamily="34" charset="0"/>
+                <a:cs typeface="Times New Roman" panose="02020603050405020304" pitchFamily="18" charset="0"/>
+              </a:rPr>
+              <a:t>C’est bon ? Prêt pour la réponse ?</a:t>
+            </a:r>
+          </a:p>
+          <a:p>
+            <a:r>
+              <a:rPr lang="fr-FR" sz="1800" dirty="0">
+                <a:effectLst/>
+                <a:latin typeface="Calibri" panose="020F0502020204030204" pitchFamily="34" charset="0"/>
+                <a:ea typeface="Calibri" panose="020F0502020204030204" pitchFamily="34" charset="0"/>
+                <a:cs typeface="Times New Roman" panose="02020603050405020304" pitchFamily="18" charset="0"/>
+              </a:rPr>
+              <a:t>Commençons par le point commun : tous deux renvoient un type </a:t>
+            </a:r>
+            <a:r>
+              <a:rPr lang="fr-FR" sz="1800" dirty="0" err="1">
+                <a:effectLst/>
+                <a:latin typeface="Calibri" panose="020F0502020204030204" pitchFamily="34" charset="0"/>
+                <a:ea typeface="Calibri" panose="020F0502020204030204" pitchFamily="34" charset="0"/>
+                <a:cs typeface="Times New Roman" panose="02020603050405020304" pitchFamily="18" charset="0"/>
+              </a:rPr>
+              <a:t>Type</a:t>
+            </a:r>
+            <a:r>
+              <a:rPr lang="fr-FR" sz="1800" dirty="0">
+                <a:effectLst/>
+                <a:latin typeface="Calibri" panose="020F0502020204030204" pitchFamily="34" charset="0"/>
+                <a:ea typeface="Calibri" panose="020F0502020204030204" pitchFamily="34" charset="0"/>
+                <a:cs typeface="Times New Roman" panose="02020603050405020304" pitchFamily="18" charset="0"/>
+              </a:rPr>
+              <a:t>. Non je n’ai pas bafouillé, j’ai bien dit tout deux renvoient un type </a:t>
+            </a:r>
+            <a:r>
+              <a:rPr lang="fr-FR" sz="1800" dirty="0" err="1">
+                <a:effectLst/>
+                <a:latin typeface="Calibri" panose="020F0502020204030204" pitchFamily="34" charset="0"/>
+                <a:ea typeface="Calibri" panose="020F0502020204030204" pitchFamily="34" charset="0"/>
+                <a:cs typeface="Times New Roman" panose="02020603050405020304" pitchFamily="18" charset="0"/>
+              </a:rPr>
+              <a:t>Type</a:t>
+            </a:r>
+            <a:r>
+              <a:rPr lang="fr-FR" sz="1800" dirty="0">
+                <a:effectLst/>
+                <a:latin typeface="Calibri" panose="020F0502020204030204" pitchFamily="34" charset="0"/>
+                <a:ea typeface="Calibri" panose="020F0502020204030204" pitchFamily="34" charset="0"/>
+                <a:cs typeface="Times New Roman" panose="02020603050405020304" pitchFamily="18" charset="0"/>
+              </a:rPr>
+              <a:t>. En </a:t>
+            </a:r>
+            <a:r>
+              <a:rPr lang="fr-FR" sz="1800" dirty="0" err="1">
+                <a:effectLst/>
+                <a:latin typeface="Calibri" panose="020F0502020204030204" pitchFamily="34" charset="0"/>
+                <a:ea typeface="Calibri" panose="020F0502020204030204" pitchFamily="34" charset="0"/>
+                <a:cs typeface="Times New Roman" panose="02020603050405020304" pitchFamily="18" charset="0"/>
+              </a:rPr>
+              <a:t>dotnet</a:t>
+            </a:r>
+            <a:r>
+              <a:rPr lang="fr-FR" sz="1800" dirty="0">
+                <a:effectLst/>
+                <a:latin typeface="Calibri" panose="020F0502020204030204" pitchFamily="34" charset="0"/>
+                <a:ea typeface="Calibri" panose="020F0502020204030204" pitchFamily="34" charset="0"/>
+                <a:cs typeface="Times New Roman" panose="02020603050405020304" pitchFamily="18" charset="0"/>
+              </a:rPr>
+              <a:t>, Type est une classe qui est le point d’entrée de la réflexion. Autrement dit, ces 2 choses renvoient des instances de classe Type.</a:t>
+            </a:r>
+          </a:p>
+          <a:p>
+            <a:r>
+              <a:rPr lang="fr-FR" sz="1800" dirty="0">
+                <a:effectLst/>
+                <a:latin typeface="Calibri" panose="020F0502020204030204" pitchFamily="34" charset="0"/>
+                <a:ea typeface="Calibri" panose="020F0502020204030204" pitchFamily="34" charset="0"/>
+                <a:cs typeface="Times New Roman" panose="02020603050405020304" pitchFamily="18" charset="0"/>
+              </a:rPr>
+              <a:t>Alors maintenant qu’elle est la différence ? Et bien tout simplement </a:t>
+            </a:r>
+            <a:r>
+              <a:rPr lang="fr-FR" sz="1800" dirty="0" err="1">
+                <a:effectLst/>
+                <a:latin typeface="Calibri" panose="020F0502020204030204" pitchFamily="34" charset="0"/>
+                <a:ea typeface="Calibri" panose="020F0502020204030204" pitchFamily="34" charset="0"/>
+                <a:cs typeface="Times New Roman" panose="02020603050405020304" pitchFamily="18" charset="0"/>
+              </a:rPr>
+              <a:t>typeof</a:t>
+            </a:r>
+            <a:r>
+              <a:rPr lang="fr-FR" sz="1800" dirty="0">
+                <a:effectLst/>
+                <a:latin typeface="Calibri" panose="020F0502020204030204" pitchFamily="34" charset="0"/>
+                <a:ea typeface="Calibri" panose="020F0502020204030204" pitchFamily="34" charset="0"/>
+                <a:cs typeface="Times New Roman" panose="02020603050405020304" pitchFamily="18" charset="0"/>
+              </a:rPr>
+              <a:t> prend en paramètre un type, alors que la méthode </a:t>
+            </a:r>
+            <a:r>
+              <a:rPr lang="fr-FR" sz="1800" dirty="0" err="1">
+                <a:effectLst/>
+                <a:latin typeface="Calibri" panose="020F0502020204030204" pitchFamily="34" charset="0"/>
+                <a:ea typeface="Calibri" panose="020F0502020204030204" pitchFamily="34" charset="0"/>
+                <a:cs typeface="Times New Roman" panose="02020603050405020304" pitchFamily="18" charset="0"/>
+              </a:rPr>
+              <a:t>GetType</a:t>
+            </a:r>
+            <a:r>
+              <a:rPr lang="fr-FR" sz="1800" dirty="0">
+                <a:effectLst/>
+                <a:latin typeface="Calibri" panose="020F0502020204030204" pitchFamily="34" charset="0"/>
+                <a:ea typeface="Calibri" panose="020F0502020204030204" pitchFamily="34" charset="0"/>
+                <a:cs typeface="Times New Roman" panose="02020603050405020304" pitchFamily="18" charset="0"/>
+              </a:rPr>
+              <a:t>() s’applique à une instance.</a:t>
+            </a:r>
+          </a:p>
+          <a:p>
+            <a:r>
+              <a:rPr lang="fr-FR" sz="1800" dirty="0">
+                <a:effectLst/>
+                <a:latin typeface="Calibri" panose="020F0502020204030204" pitchFamily="34" charset="0"/>
+                <a:ea typeface="Calibri" panose="020F0502020204030204" pitchFamily="34" charset="0"/>
+                <a:cs typeface="Times New Roman" panose="02020603050405020304" pitchFamily="18" charset="0"/>
+              </a:rPr>
+              <a:t>Mais dans tous les cas, ces 2 éléments sont la porte d’entrée de la </a:t>
+            </a:r>
+            <a:r>
+              <a:rPr lang="fr-FR" sz="1800" dirty="0" err="1">
+                <a:effectLst/>
+                <a:latin typeface="Calibri" panose="020F0502020204030204" pitchFamily="34" charset="0"/>
+                <a:ea typeface="Calibri" panose="020F0502020204030204" pitchFamily="34" charset="0"/>
+                <a:cs typeface="Times New Roman" panose="02020603050405020304" pitchFamily="18" charset="0"/>
+              </a:rPr>
+              <a:t>reflexion</a:t>
+            </a:r>
+            <a:r>
+              <a:rPr lang="fr-FR" sz="1800" dirty="0">
+                <a:effectLst/>
+                <a:latin typeface="Calibri" panose="020F0502020204030204" pitchFamily="34" charset="0"/>
+                <a:ea typeface="Calibri" panose="020F0502020204030204" pitchFamily="34" charset="0"/>
+                <a:cs typeface="Times New Roman" panose="02020603050405020304" pitchFamily="18" charset="0"/>
+              </a:rPr>
+              <a:t> dont voici un méta modèle. Pour rappel un métamodèle est un modèle dont les instances sont elles-mêmes des modèles. Comme l’indique le préfixe méta, un métamodèle est une abstraction permettant de décrire des modèles.</a:t>
+            </a:r>
+          </a:p>
+          <a:p>
+            <a:r>
+              <a:rPr lang="fr-FR" sz="1800" dirty="0">
+                <a:effectLst/>
+                <a:latin typeface="Calibri" panose="020F0502020204030204" pitchFamily="34" charset="0"/>
+                <a:ea typeface="Calibri" panose="020F0502020204030204" pitchFamily="34" charset="0"/>
+                <a:cs typeface="Times New Roman" panose="02020603050405020304" pitchFamily="18" charset="0"/>
+              </a:rPr>
+              <a:t> </a:t>
+            </a:r>
+          </a:p>
+          <a:p>
+            <a:r>
+              <a:rPr lang="fr-FR" sz="1800" dirty="0">
+                <a:effectLst/>
+                <a:latin typeface="Calibri" panose="020F0502020204030204" pitchFamily="34" charset="0"/>
+                <a:ea typeface="Calibri" panose="020F0502020204030204" pitchFamily="34" charset="0"/>
+                <a:cs typeface="Times New Roman" panose="02020603050405020304" pitchFamily="18" charset="0"/>
+              </a:rPr>
+              <a:t>Assez parlé théorie, passons à la pratique.</a:t>
+            </a:r>
+          </a:p>
+          <a:p>
+            <a:r>
+              <a:rPr lang="fr-FR" sz="1800" dirty="0">
+                <a:effectLst/>
+                <a:latin typeface="Calibri" panose="020F0502020204030204" pitchFamily="34" charset="0"/>
+                <a:ea typeface="Calibri" panose="020F0502020204030204" pitchFamily="34" charset="0"/>
+                <a:cs typeface="Times New Roman" panose="02020603050405020304" pitchFamily="18" charset="0"/>
+              </a:rPr>
+              <a:t>Comme d’habitude vous trouverez une dossier Starter et un dossier Solution. Le dossier Starter vous fournit une trame de démarrage vous permettant de vous focaliser uniquement sur les apprentissages utiles pour cette formation.</a:t>
+            </a:r>
+          </a:p>
+          <a:p>
+            <a:r>
+              <a:rPr lang="fr-FR" sz="1800" dirty="0">
+                <a:effectLst/>
+                <a:latin typeface="Calibri" panose="020F0502020204030204" pitchFamily="34" charset="0"/>
+                <a:ea typeface="Calibri" panose="020F0502020204030204" pitchFamily="34" charset="0"/>
+                <a:cs typeface="Times New Roman" panose="02020603050405020304" pitchFamily="18" charset="0"/>
+              </a:rPr>
+              <a:t>Je vous demanderais de jouer le jeu, et de ne regarder la solution qu’à la fin. Si vous avez un quelconque blocage, l’idée est de m’appeler afin que je puisse vous donner les explications nécessaires. Mais soyez rassuré, la solution complète est disponible dans son dossier pour une relecture ultérieure.</a:t>
+            </a:r>
+          </a:p>
+          <a:p>
+            <a:r>
+              <a:rPr lang="fr-FR" sz="1800" dirty="0">
+                <a:effectLst/>
+                <a:latin typeface="Calibri" panose="020F0502020204030204" pitchFamily="34" charset="0"/>
+                <a:ea typeface="Calibri" panose="020F0502020204030204" pitchFamily="34" charset="0"/>
+                <a:cs typeface="Times New Roman" panose="02020603050405020304" pitchFamily="18" charset="0"/>
+              </a:rPr>
+              <a:t> </a:t>
+            </a:r>
+          </a:p>
+          <a:p>
+            <a:r>
+              <a:rPr lang="fr-FR" sz="1800" dirty="0">
+                <a:effectLst/>
+                <a:latin typeface="Calibri" panose="020F0502020204030204" pitchFamily="34" charset="0"/>
+                <a:ea typeface="Calibri" panose="020F0502020204030204" pitchFamily="34" charset="0"/>
+                <a:cs typeface="Times New Roman" panose="02020603050405020304" pitchFamily="18" charset="0"/>
+              </a:rPr>
+              <a:t>Je vous invite donc à ouvrir la solution du dossier Starter.</a:t>
+            </a:r>
+          </a:p>
+          <a:p>
+            <a:r>
+              <a:rPr lang="fr-FR" sz="1800" dirty="0">
+                <a:effectLst/>
+                <a:latin typeface="Calibri" panose="020F0502020204030204" pitchFamily="34" charset="0"/>
+                <a:ea typeface="Calibri" panose="020F0502020204030204" pitchFamily="34" charset="0"/>
+                <a:cs typeface="Times New Roman" panose="02020603050405020304" pitchFamily="18" charset="0"/>
+              </a:rPr>
+              <a:t>Lorsque vous ouvrez la solution, vous trouverez 3 projets : </a:t>
+            </a:r>
+            <a:r>
+              <a:rPr lang="fr-FR" sz="1800" dirty="0" err="1">
+                <a:effectLst/>
+                <a:latin typeface="Calibri" panose="020F0502020204030204" pitchFamily="34" charset="0"/>
+                <a:ea typeface="Calibri" panose="020F0502020204030204" pitchFamily="34" charset="0"/>
+                <a:cs typeface="Times New Roman" panose="02020603050405020304" pitchFamily="18" charset="0"/>
+              </a:rPr>
+              <a:t>CommandLineParser</a:t>
+            </a:r>
+            <a:r>
+              <a:rPr lang="fr-FR" sz="1800" dirty="0">
+                <a:effectLst/>
+                <a:latin typeface="Calibri" panose="020F0502020204030204" pitchFamily="34" charset="0"/>
+                <a:ea typeface="Calibri" panose="020F0502020204030204" pitchFamily="34" charset="0"/>
+                <a:cs typeface="Times New Roman" panose="02020603050405020304" pitchFamily="18" charset="0"/>
+              </a:rPr>
+              <a:t>, </a:t>
+            </a:r>
+            <a:r>
+              <a:rPr lang="fr-FR" sz="1800" dirty="0" err="1">
+                <a:effectLst/>
+                <a:latin typeface="Calibri" panose="020F0502020204030204" pitchFamily="34" charset="0"/>
+                <a:ea typeface="Calibri" panose="020F0502020204030204" pitchFamily="34" charset="0"/>
+                <a:cs typeface="Times New Roman" panose="02020603050405020304" pitchFamily="18" charset="0"/>
+              </a:rPr>
+              <a:t>SqlExec</a:t>
+            </a:r>
+            <a:r>
+              <a:rPr lang="fr-FR" sz="1800" dirty="0">
+                <a:effectLst/>
+                <a:latin typeface="Calibri" panose="020F0502020204030204" pitchFamily="34" charset="0"/>
+                <a:ea typeface="Calibri" panose="020F0502020204030204" pitchFamily="34" charset="0"/>
+                <a:cs typeface="Times New Roman" panose="02020603050405020304" pitchFamily="18" charset="0"/>
+              </a:rPr>
+              <a:t> et </a:t>
+            </a:r>
+            <a:r>
+              <a:rPr lang="fr-FR" sz="1800" dirty="0" err="1">
+                <a:effectLst/>
+                <a:latin typeface="Calibri" panose="020F0502020204030204" pitchFamily="34" charset="0"/>
+                <a:ea typeface="Calibri" panose="020F0502020204030204" pitchFamily="34" charset="0"/>
+                <a:cs typeface="Times New Roman" panose="02020603050405020304" pitchFamily="18" charset="0"/>
+              </a:rPr>
+              <a:t>SqlExec.UnitTests</a:t>
+            </a:r>
+            <a:r>
+              <a:rPr lang="fr-FR" sz="1800" dirty="0">
+                <a:effectLst/>
+                <a:latin typeface="Calibri" panose="020F0502020204030204" pitchFamily="34" charset="0"/>
+                <a:ea typeface="Calibri" panose="020F0502020204030204" pitchFamily="34" charset="0"/>
+                <a:cs typeface="Times New Roman" panose="02020603050405020304" pitchFamily="18" charset="0"/>
+              </a:rPr>
+              <a:t>.</a:t>
+            </a:r>
+          </a:p>
+          <a:p>
+            <a:r>
+              <a:rPr lang="fr-FR" sz="1800" dirty="0">
+                <a:effectLst/>
+                <a:latin typeface="Calibri" panose="020F0502020204030204" pitchFamily="34" charset="0"/>
+                <a:ea typeface="Calibri" panose="020F0502020204030204" pitchFamily="34" charset="0"/>
+                <a:cs typeface="Times New Roman" panose="02020603050405020304" pitchFamily="18" charset="0"/>
+              </a:rPr>
+              <a:t>Tout votre développement, se situera dans la librairie </a:t>
+            </a:r>
+            <a:r>
+              <a:rPr lang="fr-FR" sz="1800" dirty="0" err="1">
+                <a:effectLst/>
+                <a:latin typeface="Calibri" panose="020F0502020204030204" pitchFamily="34" charset="0"/>
+                <a:ea typeface="Calibri" panose="020F0502020204030204" pitchFamily="34" charset="0"/>
+                <a:cs typeface="Times New Roman" panose="02020603050405020304" pitchFamily="18" charset="0"/>
+              </a:rPr>
+              <a:t>CommandLineParser</a:t>
+            </a:r>
+            <a:r>
+              <a:rPr lang="fr-FR" sz="1800" dirty="0">
+                <a:effectLst/>
+                <a:latin typeface="Calibri" panose="020F0502020204030204" pitchFamily="34" charset="0"/>
+                <a:ea typeface="Calibri" panose="020F0502020204030204" pitchFamily="34" charset="0"/>
+                <a:cs typeface="Times New Roman" panose="02020603050405020304" pitchFamily="18" charset="0"/>
+              </a:rPr>
+              <a:t>. Les 2 autres projets ne sont pas à modifier.</a:t>
+            </a:r>
+          </a:p>
+          <a:p>
+            <a:r>
+              <a:rPr lang="fr-FR" sz="1800" dirty="0">
+                <a:effectLst/>
+                <a:latin typeface="Calibri" panose="020F0502020204030204" pitchFamily="34" charset="0"/>
+                <a:ea typeface="Calibri" panose="020F0502020204030204" pitchFamily="34" charset="0"/>
+                <a:cs typeface="Times New Roman" panose="02020603050405020304" pitchFamily="18" charset="0"/>
+              </a:rPr>
+              <a:t> </a:t>
+            </a:r>
+          </a:p>
+          <a:p>
+            <a:r>
+              <a:rPr lang="fr-FR" sz="1800" dirty="0">
+                <a:effectLst/>
+                <a:latin typeface="Calibri" panose="020F0502020204030204" pitchFamily="34" charset="0"/>
+                <a:ea typeface="Calibri" panose="020F0502020204030204" pitchFamily="34" charset="0"/>
+                <a:cs typeface="Times New Roman" panose="02020603050405020304" pitchFamily="18" charset="0"/>
+              </a:rPr>
+              <a:t>Le projet </a:t>
+            </a:r>
+            <a:r>
+              <a:rPr lang="fr-FR" sz="1800" dirty="0" err="1">
+                <a:effectLst/>
+                <a:latin typeface="Calibri" panose="020F0502020204030204" pitchFamily="34" charset="0"/>
+                <a:ea typeface="Calibri" panose="020F0502020204030204" pitchFamily="34" charset="0"/>
+                <a:cs typeface="Times New Roman" panose="02020603050405020304" pitchFamily="18" charset="0"/>
+              </a:rPr>
+              <a:t>SqlExec.UnitTests</a:t>
+            </a:r>
+            <a:r>
+              <a:rPr lang="fr-FR" sz="1800" dirty="0">
+                <a:effectLst/>
+                <a:latin typeface="Calibri" panose="020F0502020204030204" pitchFamily="34" charset="0"/>
+                <a:ea typeface="Calibri" panose="020F0502020204030204" pitchFamily="34" charset="0"/>
+                <a:cs typeface="Times New Roman" panose="02020603050405020304" pitchFamily="18" charset="0"/>
+              </a:rPr>
+              <a:t> est un projet de test unitaires. Quand tous les tests seront au vert, l’exercice sera terminé avec succès.</a:t>
+            </a:r>
+          </a:p>
+          <a:p>
+            <a:r>
+              <a:rPr lang="fr-FR" sz="1800" dirty="0">
+                <a:effectLst/>
+                <a:latin typeface="Calibri" panose="020F0502020204030204" pitchFamily="34" charset="0"/>
+                <a:ea typeface="Calibri" panose="020F0502020204030204" pitchFamily="34" charset="0"/>
+                <a:cs typeface="Times New Roman" panose="02020603050405020304" pitchFamily="18" charset="0"/>
+              </a:rPr>
+              <a:t> </a:t>
+            </a:r>
+          </a:p>
+          <a:p>
+            <a:r>
+              <a:rPr lang="fr-FR" sz="1800" dirty="0">
+                <a:effectLst/>
+                <a:latin typeface="Calibri" panose="020F0502020204030204" pitchFamily="34" charset="0"/>
+                <a:ea typeface="Calibri" panose="020F0502020204030204" pitchFamily="34" charset="0"/>
+                <a:cs typeface="Times New Roman" panose="02020603050405020304" pitchFamily="18" charset="0"/>
+              </a:rPr>
+              <a:t>Le projet </a:t>
+            </a:r>
+            <a:r>
+              <a:rPr lang="fr-FR" sz="1800" dirty="0" err="1">
+                <a:effectLst/>
+                <a:latin typeface="Calibri" panose="020F0502020204030204" pitchFamily="34" charset="0"/>
+                <a:ea typeface="Calibri" panose="020F0502020204030204" pitchFamily="34" charset="0"/>
+                <a:cs typeface="Times New Roman" panose="02020603050405020304" pitchFamily="18" charset="0"/>
+              </a:rPr>
+              <a:t>SqlExec</a:t>
+            </a:r>
+            <a:r>
+              <a:rPr lang="fr-FR" sz="1800" dirty="0">
+                <a:effectLst/>
+                <a:latin typeface="Calibri" panose="020F0502020204030204" pitchFamily="34" charset="0"/>
+                <a:ea typeface="Calibri" panose="020F0502020204030204" pitchFamily="34" charset="0"/>
+                <a:cs typeface="Times New Roman" panose="02020603050405020304" pitchFamily="18" charset="0"/>
+              </a:rPr>
+              <a:t> est un projet exemple. C’est un petit outil en ligne de commande qui permet d’exécuter des scripts SQL. Mais cet outil a besoin de nombreux paramètres que l’on peut fournir en ligne de commande.</a:t>
+            </a:r>
+          </a:p>
+          <a:p>
+            <a:r>
+              <a:rPr lang="fr-FR" sz="1800" dirty="0">
+                <a:effectLst/>
+                <a:latin typeface="Calibri" panose="020F0502020204030204" pitchFamily="34" charset="0"/>
+                <a:ea typeface="Calibri" panose="020F0502020204030204" pitchFamily="34" charset="0"/>
+                <a:cs typeface="Times New Roman" panose="02020603050405020304" pitchFamily="18" charset="0"/>
+              </a:rPr>
+              <a:t>Cet outil est inspiré de l’outil </a:t>
+            </a:r>
+            <a:r>
+              <a:rPr lang="fr-FR" sz="1800" dirty="0" err="1">
+                <a:effectLst/>
+                <a:latin typeface="Calibri" panose="020F0502020204030204" pitchFamily="34" charset="0"/>
+                <a:ea typeface="Calibri" panose="020F0502020204030204" pitchFamily="34" charset="0"/>
+                <a:cs typeface="Times New Roman" panose="02020603050405020304" pitchFamily="18" charset="0"/>
+              </a:rPr>
+              <a:t>SqlCmd</a:t>
+            </a:r>
+            <a:r>
+              <a:rPr lang="fr-FR" sz="1800" dirty="0">
+                <a:effectLst/>
+                <a:latin typeface="Calibri" panose="020F0502020204030204" pitchFamily="34" charset="0"/>
+                <a:ea typeface="Calibri" panose="020F0502020204030204" pitchFamily="34" charset="0"/>
+                <a:cs typeface="Times New Roman" panose="02020603050405020304" pitchFamily="18" charset="0"/>
+              </a:rPr>
+              <a:t> de </a:t>
+            </a:r>
+            <a:r>
+              <a:rPr lang="fr-FR" sz="1800" dirty="0" err="1">
+                <a:effectLst/>
+                <a:latin typeface="Calibri" panose="020F0502020204030204" pitchFamily="34" charset="0"/>
+                <a:ea typeface="Calibri" panose="020F0502020204030204" pitchFamily="34" charset="0"/>
+                <a:cs typeface="Times New Roman" panose="02020603050405020304" pitchFamily="18" charset="0"/>
+              </a:rPr>
+              <a:t>sql</a:t>
+            </a:r>
+            <a:r>
+              <a:rPr lang="fr-FR" sz="1800" dirty="0">
+                <a:effectLst/>
+                <a:latin typeface="Calibri" panose="020F0502020204030204" pitchFamily="34" charset="0"/>
+                <a:ea typeface="Calibri" panose="020F0502020204030204" pitchFamily="34" charset="0"/>
+                <a:cs typeface="Times New Roman" panose="02020603050405020304" pitchFamily="18" charset="0"/>
+              </a:rPr>
+              <a:t> server.</a:t>
+            </a:r>
+          </a:p>
+          <a:p>
+            <a:r>
+              <a:rPr lang="fr-FR" sz="1800" dirty="0">
+                <a:effectLst/>
+                <a:latin typeface="Calibri" panose="020F0502020204030204" pitchFamily="34" charset="0"/>
+                <a:ea typeface="Calibri" panose="020F0502020204030204" pitchFamily="34" charset="0"/>
+                <a:cs typeface="Times New Roman" panose="02020603050405020304" pitchFamily="18" charset="0"/>
+              </a:rPr>
+              <a:t>Pour des raisons pédagogiques, j’ai « débranché » l’exécution de scripts SQL afin de faciliter le </a:t>
+            </a:r>
+            <a:r>
+              <a:rPr lang="fr-FR" sz="1800" dirty="0" err="1">
+                <a:effectLst/>
+                <a:latin typeface="Calibri" panose="020F0502020204030204" pitchFamily="34" charset="0"/>
+                <a:ea typeface="Calibri" panose="020F0502020204030204" pitchFamily="34" charset="0"/>
+                <a:cs typeface="Times New Roman" panose="02020603050405020304" pitchFamily="18" charset="0"/>
+              </a:rPr>
+              <a:t>déboggage</a:t>
+            </a:r>
+            <a:r>
+              <a:rPr lang="fr-FR" sz="1800" dirty="0">
+                <a:effectLst/>
+                <a:latin typeface="Calibri" panose="020F0502020204030204" pitchFamily="34" charset="0"/>
+                <a:ea typeface="Calibri" panose="020F0502020204030204" pitchFamily="34" charset="0"/>
+                <a:cs typeface="Times New Roman" panose="02020603050405020304" pitchFamily="18" charset="0"/>
+              </a:rPr>
+              <a:t>.</a:t>
+            </a:r>
+          </a:p>
+          <a:p>
+            <a:r>
+              <a:rPr lang="fr-FR" sz="1800" dirty="0">
+                <a:effectLst/>
+                <a:latin typeface="Calibri" panose="020F0502020204030204" pitchFamily="34" charset="0"/>
+                <a:ea typeface="Calibri" panose="020F0502020204030204" pitchFamily="34" charset="0"/>
+                <a:cs typeface="Times New Roman" panose="02020603050405020304" pitchFamily="18" charset="0"/>
+              </a:rPr>
+              <a:t>Pour exécuter cet outil, il faut lui donner, le nom du serveur, le </a:t>
+            </a:r>
+            <a:r>
+              <a:rPr lang="fr-FR" sz="1800" dirty="0" err="1">
+                <a:effectLst/>
+                <a:latin typeface="Calibri" panose="020F0502020204030204" pitchFamily="34" charset="0"/>
+                <a:ea typeface="Calibri" panose="020F0502020204030204" pitchFamily="34" charset="0"/>
+                <a:cs typeface="Times New Roman" panose="02020603050405020304" pitchFamily="18" charset="0"/>
+              </a:rPr>
+              <a:t>username</a:t>
+            </a:r>
+            <a:r>
+              <a:rPr lang="fr-FR" sz="1800" dirty="0">
+                <a:effectLst/>
+                <a:latin typeface="Calibri" panose="020F0502020204030204" pitchFamily="34" charset="0"/>
+                <a:ea typeface="Calibri" panose="020F0502020204030204" pitchFamily="34" charset="0"/>
+                <a:cs typeface="Times New Roman" panose="02020603050405020304" pitchFamily="18" charset="0"/>
+              </a:rPr>
+              <a:t>, le </a:t>
+            </a:r>
+            <a:r>
+              <a:rPr lang="fr-FR" sz="1800" dirty="0" err="1">
+                <a:effectLst/>
+                <a:latin typeface="Calibri" panose="020F0502020204030204" pitchFamily="34" charset="0"/>
+                <a:ea typeface="Calibri" panose="020F0502020204030204" pitchFamily="34" charset="0"/>
+                <a:cs typeface="Times New Roman" panose="02020603050405020304" pitchFamily="18" charset="0"/>
+              </a:rPr>
+              <a:t>password</a:t>
+            </a:r>
+            <a:r>
+              <a:rPr lang="fr-FR" sz="1800" dirty="0">
+                <a:effectLst/>
+                <a:latin typeface="Calibri" panose="020F0502020204030204" pitchFamily="34" charset="0"/>
+                <a:ea typeface="Calibri" panose="020F0502020204030204" pitchFamily="34" charset="0"/>
+                <a:cs typeface="Times New Roman" panose="02020603050405020304" pitchFamily="18" charset="0"/>
+              </a:rPr>
+              <a:t> etc…</a:t>
+            </a:r>
+          </a:p>
+          <a:p>
+            <a:r>
+              <a:rPr lang="fr-FR" sz="1800" dirty="0">
+                <a:effectLst/>
+                <a:latin typeface="Calibri" panose="020F0502020204030204" pitchFamily="34" charset="0"/>
+                <a:ea typeface="Calibri" panose="020F0502020204030204" pitchFamily="34" charset="0"/>
+                <a:cs typeface="Times New Roman" panose="02020603050405020304" pitchFamily="18" charset="0"/>
+              </a:rPr>
+              <a:t>La liste des paramètres est regroupée dans la classe </a:t>
+            </a:r>
+            <a:r>
+              <a:rPr lang="fr-FR" sz="1800" dirty="0" err="1">
+                <a:effectLst/>
+                <a:latin typeface="Calibri" panose="020F0502020204030204" pitchFamily="34" charset="0"/>
+                <a:ea typeface="Calibri" panose="020F0502020204030204" pitchFamily="34" charset="0"/>
+                <a:cs typeface="Times New Roman" panose="02020603050405020304" pitchFamily="18" charset="0"/>
+              </a:rPr>
+              <a:t>CommandLineOptions</a:t>
+            </a:r>
+            <a:r>
+              <a:rPr lang="fr-FR" sz="1800" dirty="0">
+                <a:effectLst/>
+                <a:latin typeface="Calibri" panose="020F0502020204030204" pitchFamily="34" charset="0"/>
+                <a:ea typeface="Calibri" panose="020F0502020204030204" pitchFamily="34" charset="0"/>
+                <a:cs typeface="Times New Roman" panose="02020603050405020304" pitchFamily="18" charset="0"/>
+              </a:rPr>
+              <a:t> qui utilise des attributs pour auto documenter l’outil, et aussi pour avoir des paramètres en syntaxe courte cad 1 lettre ou syntaxe longue cad 1 chaine de caractère.</a:t>
+            </a:r>
+          </a:p>
+          <a:p>
+            <a:r>
+              <a:rPr lang="fr-FR" sz="1800" dirty="0">
+                <a:effectLst/>
+                <a:latin typeface="Calibri" panose="020F0502020204030204" pitchFamily="34" charset="0"/>
+                <a:ea typeface="Calibri" panose="020F0502020204030204" pitchFamily="34" charset="0"/>
+                <a:cs typeface="Times New Roman" panose="02020603050405020304" pitchFamily="18" charset="0"/>
+              </a:rPr>
+              <a:t> </a:t>
+            </a:r>
+          </a:p>
+          <a:p>
+            <a:r>
+              <a:rPr lang="fr-FR" sz="1800" dirty="0">
+                <a:effectLst/>
+                <a:latin typeface="Calibri" panose="020F0502020204030204" pitchFamily="34" charset="0"/>
+                <a:ea typeface="Calibri" panose="020F0502020204030204" pitchFamily="34" charset="0"/>
+                <a:cs typeface="Times New Roman" panose="02020603050405020304" pitchFamily="18" charset="0"/>
+              </a:rPr>
+              <a:t>Le but de cet exercice, est de vous constituer une librairie « </a:t>
+            </a:r>
+            <a:r>
+              <a:rPr lang="fr-FR" sz="1800" dirty="0" err="1">
+                <a:effectLst/>
+                <a:latin typeface="Calibri" panose="020F0502020204030204" pitchFamily="34" charset="0"/>
+                <a:ea typeface="Calibri" panose="020F0502020204030204" pitchFamily="34" charset="0"/>
+                <a:cs typeface="Times New Roman" panose="02020603050405020304" pitchFamily="18" charset="0"/>
+              </a:rPr>
+              <a:t>CommandLineParser</a:t>
+            </a:r>
+            <a:r>
+              <a:rPr lang="fr-FR" sz="1800" dirty="0">
+                <a:effectLst/>
+                <a:latin typeface="Calibri" panose="020F0502020204030204" pitchFamily="34" charset="0"/>
+                <a:ea typeface="Calibri" panose="020F0502020204030204" pitchFamily="34" charset="0"/>
+                <a:cs typeface="Times New Roman" panose="02020603050405020304" pitchFamily="18" charset="0"/>
+              </a:rPr>
+              <a:t> » qui doit être réutilisable pour d’autres projets. Si vous devez créer un nouvel outil en ligne de commande, vous pourrez utiliser un parseur qui vous renvoie une instance représentant vos arguments.</a:t>
+            </a:r>
+          </a:p>
+          <a:p>
+            <a:r>
+              <a:rPr lang="fr-FR" sz="1800" dirty="0">
+                <a:effectLst/>
+                <a:latin typeface="Calibri" panose="020F0502020204030204" pitchFamily="34" charset="0"/>
+                <a:ea typeface="Calibri" panose="020F0502020204030204" pitchFamily="34" charset="0"/>
+                <a:cs typeface="Times New Roman" panose="02020603050405020304" pitchFamily="18" charset="0"/>
+              </a:rPr>
+              <a:t> </a:t>
+            </a:r>
+          </a:p>
+          <a:p>
+            <a:r>
+              <a:rPr lang="fr-FR" sz="1800" dirty="0">
+                <a:effectLst/>
+                <a:latin typeface="Calibri" panose="020F0502020204030204" pitchFamily="34" charset="0"/>
+                <a:ea typeface="Calibri" panose="020F0502020204030204" pitchFamily="34" charset="0"/>
+                <a:cs typeface="Times New Roman" panose="02020603050405020304" pitchFamily="18" charset="0"/>
+              </a:rPr>
+              <a:t>Alors pour vous guider, je vous invite à suivre les TODO disposés dans le code un peu partout. Ils sont numérotés et sont autant d’étapes à franchir.</a:t>
+            </a:r>
+          </a:p>
+          <a:p>
+            <a:r>
+              <a:rPr lang="fr-FR" sz="1800" dirty="0">
+                <a:effectLst/>
+                <a:latin typeface="Calibri" panose="020F0502020204030204" pitchFamily="34" charset="0"/>
+                <a:ea typeface="Calibri" panose="020F0502020204030204" pitchFamily="34" charset="0"/>
+                <a:cs typeface="Times New Roman" panose="02020603050405020304" pitchFamily="18" charset="0"/>
+              </a:rPr>
+              <a:t>Une fois les 2 premiers TODO faits, votre projet devrait compiler.</a:t>
+            </a:r>
+          </a:p>
+          <a:p>
+            <a:r>
+              <a:rPr lang="fr-FR" sz="1800" dirty="0">
+                <a:effectLst/>
+                <a:latin typeface="Calibri" panose="020F0502020204030204" pitchFamily="34" charset="0"/>
+                <a:ea typeface="Calibri" panose="020F0502020204030204" pitchFamily="34" charset="0"/>
+                <a:cs typeface="Times New Roman" panose="02020603050405020304" pitchFamily="18" charset="0"/>
+              </a:rPr>
+              <a:t> </a:t>
+            </a:r>
+          </a:p>
+          <a:p>
+            <a:r>
+              <a:rPr lang="fr-FR" sz="1800" dirty="0">
+                <a:effectLst/>
+                <a:latin typeface="Calibri" panose="020F0502020204030204" pitchFamily="34" charset="0"/>
+                <a:ea typeface="Calibri" panose="020F0502020204030204" pitchFamily="34" charset="0"/>
+                <a:cs typeface="Times New Roman" panose="02020603050405020304" pitchFamily="18" charset="0"/>
+              </a:rPr>
+              <a:t>Il ne me reste plus qu’à vous souhaiter un bon exercice, et prendre autant de plaisir à le réaliser que moi de l’avoir conçu.</a:t>
+            </a:r>
+          </a:p>
+          <a:p>
+            <a:r>
+              <a:rPr lang="fr-FR" sz="1800" dirty="0">
+                <a:effectLst/>
+                <a:latin typeface="Calibri" panose="020F0502020204030204" pitchFamily="34" charset="0"/>
+                <a:ea typeface="Calibri" panose="020F0502020204030204" pitchFamily="34" charset="0"/>
+                <a:cs typeface="Times New Roman" panose="02020603050405020304" pitchFamily="18" charset="0"/>
+              </a:rPr>
+              <a:t>A bientôt</a:t>
+            </a:r>
+          </a:p>
+          <a:p>
+            <a:r>
+              <a:rPr lang="fr-FR" sz="1800" dirty="0">
+                <a:effectLst/>
+                <a:latin typeface="Calibri" panose="020F0502020204030204" pitchFamily="34" charset="0"/>
+                <a:ea typeface="Calibri" panose="020F0502020204030204" pitchFamily="34" charset="0"/>
+                <a:cs typeface="Times New Roman" panose="02020603050405020304" pitchFamily="18" charset="0"/>
+              </a:rPr>
+              <a:t> </a:t>
+            </a:r>
+          </a:p>
+          <a:p>
+            <a:r>
+              <a:rPr lang="fr-FR" sz="1800">
+                <a:effectLst/>
+                <a:latin typeface="Calibri" panose="020F0502020204030204" pitchFamily="34" charset="0"/>
+                <a:ea typeface="Calibri" panose="020F0502020204030204" pitchFamily="34" charset="0"/>
+                <a:cs typeface="Times New Roman" panose="02020603050405020304" pitchFamily="18" charset="0"/>
+              </a:rPr>
+              <a:t> </a:t>
+            </a:r>
+          </a:p>
+        </p:txBody>
+      </p:sp>
+      <p:sp>
+        <p:nvSpPr>
+          <p:cNvPr id="4" name="Espace réservé du numéro de diapositive 3"/>
+          <p:cNvSpPr>
+            <a:spLocks noGrp="1"/>
+          </p:cNvSpPr>
+          <p:nvPr>
+            <p:ph type="sldNum" sz="quarter" idx="5"/>
+          </p:nvPr>
+        </p:nvSpPr>
+        <p:spPr/>
+        <p:txBody>
+          <a:bodyPr/>
+          <a:lstStyle/>
+          <a:p>
+            <a:fld id="{06C65CB2-F9C5-48FF-A234-0BD63FBDD1F2}" type="slidenum">
+              <a:rPr lang="fr-FR" smtClean="0"/>
+              <a:t>1</a:t>
+            </a:fld>
+            <a:endParaRPr lang="fr-FR"/>
+          </a:p>
+        </p:txBody>
+      </p:sp>
+    </p:spTree>
+    <p:extLst>
+      <p:ext uri="{BB962C8B-B14F-4D97-AF65-F5344CB8AC3E}">
+        <p14:creationId xmlns:p14="http://schemas.microsoft.com/office/powerpoint/2010/main" val="1986390812"/>
+      </p:ext>
+    </p:extLst>
+  </p:cSld>
+  <p:clrMapOvr>
+    <a:masterClrMapping/>
+  </p:clrMapOvr>
+</p:notes>
+</file>
+
+<file path=ppt/notesSlides/notesSlide2.xml><?xml version="1.0" encoding="utf-8"?>
+<p:notes xmlns:a="http://schemas.openxmlformats.org/drawingml/2006/main" xmlns:r="http://schemas.openxmlformats.org/officeDocument/2006/relationships" xmlns:p="http://schemas.openxmlformats.org/presentationml/2006/main">
+  <p:cSld>
+    <p:spTree>
+      <p:nvGrpSpPr>
+        <p:cNvPr id="1" name=""/>
+        <p:cNvGrpSpPr/>
+        <p:nvPr/>
+      </p:nvGrpSpPr>
+      <p:grpSpPr>
+        <a:xfrm>
+          <a:off x="0" y="0"/>
+          <a:ext cx="0" cy="0"/>
+          <a:chOff x="0" y="0"/>
+          <a:chExt cx="0" cy="0"/>
+        </a:xfrm>
+      </p:grpSpPr>
+      <p:sp>
+        <p:nvSpPr>
+          <p:cNvPr id="2" name="Espace réservé de l'image des diapositives 1"/>
+          <p:cNvSpPr>
+            <a:spLocks noGrp="1" noRot="1" noChangeAspect="1"/>
+          </p:cNvSpPr>
+          <p:nvPr>
+            <p:ph type="sldImg"/>
+          </p:nvPr>
+        </p:nvSpPr>
+        <p:spPr/>
+      </p:sp>
+      <p:sp>
+        <p:nvSpPr>
+          <p:cNvPr id="3" name="Espace réservé des notes 2"/>
+          <p:cNvSpPr>
+            <a:spLocks noGrp="1"/>
+          </p:cNvSpPr>
+          <p:nvPr>
+            <p:ph type="body" idx="1"/>
+          </p:nvPr>
+        </p:nvSpPr>
+        <p:spPr/>
+        <p:txBody>
+          <a:bodyPr/>
+          <a:lstStyle/>
+          <a:p>
+            <a:r>
+              <a:rPr lang="en-US" dirty="0"/>
+              <a:t> public class A </a:t>
+            </a:r>
+          </a:p>
+          <a:p>
+            <a:r>
+              <a:rPr lang="en-US" dirty="0"/>
+              <a:t>    {</a:t>
+            </a:r>
+          </a:p>
+          <a:p>
+            <a:r>
+              <a:rPr lang="en-US" dirty="0"/>
+              <a:t>        public void method() { }</a:t>
+            </a:r>
+          </a:p>
+          <a:p>
+            <a:r>
+              <a:rPr lang="en-US" dirty="0"/>
+              <a:t>    }</a:t>
+            </a:r>
+            <a:endParaRPr lang="fr-FR" dirty="0"/>
+          </a:p>
+          <a:p>
+            <a:endParaRPr lang="fr-FR" dirty="0"/>
+          </a:p>
+          <a:p>
+            <a:r>
+              <a:rPr lang="fr-FR" dirty="0"/>
+              <a:t>            Type typeA1 = </a:t>
+            </a:r>
+            <a:r>
+              <a:rPr lang="fr-FR" dirty="0" err="1"/>
+              <a:t>typeof</a:t>
+            </a:r>
+            <a:r>
+              <a:rPr lang="fr-FR" dirty="0"/>
+              <a:t>(A);</a:t>
+            </a:r>
+          </a:p>
+          <a:p>
+            <a:r>
+              <a:rPr lang="fr-FR" dirty="0"/>
+              <a:t>            A </a:t>
+            </a:r>
+            <a:r>
+              <a:rPr lang="fr-FR" dirty="0" err="1"/>
+              <a:t>a</a:t>
+            </a:r>
+            <a:r>
+              <a:rPr lang="fr-FR" dirty="0"/>
+              <a:t> = new A();</a:t>
+            </a:r>
+          </a:p>
+          <a:p>
+            <a:r>
+              <a:rPr lang="fr-FR" dirty="0"/>
+              <a:t>            Type typeA2 = </a:t>
+            </a:r>
+            <a:r>
+              <a:rPr lang="fr-FR" dirty="0" err="1"/>
+              <a:t>a.GetType</a:t>
+            </a:r>
+            <a:r>
+              <a:rPr lang="fr-FR" dirty="0"/>
+              <a:t>();</a:t>
+            </a:r>
+          </a:p>
+          <a:p>
+            <a:r>
+              <a:rPr lang="fr-FR" dirty="0"/>
+              <a:t>            </a:t>
+            </a:r>
+            <a:r>
+              <a:rPr lang="fr-FR" dirty="0" err="1"/>
+              <a:t>Console.WriteLine</a:t>
+            </a:r>
+            <a:r>
+              <a:rPr lang="fr-FR" dirty="0"/>
+              <a:t>(typeA1 == typeA2); // display </a:t>
+            </a:r>
+            <a:r>
+              <a:rPr lang="fr-FR" dirty="0" err="1"/>
+              <a:t>true</a:t>
+            </a:r>
+            <a:endParaRPr lang="fr-FR" dirty="0"/>
+          </a:p>
+          <a:p>
+            <a:r>
+              <a:rPr lang="fr-FR" dirty="0"/>
+              <a:t>            var </a:t>
+            </a:r>
+            <a:r>
+              <a:rPr lang="fr-FR" dirty="0" err="1"/>
+              <a:t>list</a:t>
+            </a:r>
+            <a:r>
+              <a:rPr lang="fr-FR" dirty="0"/>
+              <a:t> = typeA1.GetMethods();</a:t>
+            </a:r>
+          </a:p>
+          <a:p>
+            <a:r>
+              <a:rPr lang="fr-FR" dirty="0"/>
+              <a:t>            </a:t>
+            </a:r>
+            <a:r>
+              <a:rPr lang="fr-FR" dirty="0" err="1"/>
+              <a:t>foreach</a:t>
+            </a:r>
+            <a:r>
+              <a:rPr lang="fr-FR" dirty="0"/>
+              <a:t> (var item in </a:t>
+            </a:r>
+            <a:r>
+              <a:rPr lang="fr-FR" dirty="0" err="1"/>
+              <a:t>list</a:t>
+            </a:r>
+            <a:r>
+              <a:rPr lang="fr-FR" dirty="0"/>
+              <a:t>)</a:t>
+            </a:r>
+          </a:p>
+          <a:p>
+            <a:r>
+              <a:rPr lang="fr-FR" dirty="0"/>
+              <a:t>            {</a:t>
+            </a:r>
+          </a:p>
+          <a:p>
+            <a:r>
+              <a:rPr lang="fr-FR" dirty="0"/>
+              <a:t>                </a:t>
+            </a:r>
+            <a:r>
+              <a:rPr lang="fr-FR" dirty="0" err="1"/>
+              <a:t>Console.WriteLine</a:t>
+            </a:r>
+            <a:r>
+              <a:rPr lang="fr-FR" dirty="0"/>
+              <a:t>(item);</a:t>
+            </a:r>
+          </a:p>
+          <a:p>
+            <a:r>
+              <a:rPr lang="fr-FR" dirty="0"/>
+              <a:t>            }</a:t>
+            </a:r>
+          </a:p>
+          <a:p>
+            <a:r>
+              <a:rPr lang="fr-FR" dirty="0"/>
+              <a:t>            // Display the 5 </a:t>
+            </a:r>
+            <a:r>
+              <a:rPr lang="fr-FR" dirty="0" err="1"/>
+              <a:t>following</a:t>
+            </a:r>
+            <a:r>
+              <a:rPr lang="fr-FR" dirty="0"/>
+              <a:t> </a:t>
+            </a:r>
+            <a:r>
+              <a:rPr lang="fr-FR" dirty="0" err="1"/>
+              <a:t>methods</a:t>
+            </a:r>
+            <a:r>
+              <a:rPr lang="fr-FR" dirty="0"/>
+              <a:t> :</a:t>
+            </a:r>
+          </a:p>
+          <a:p>
+            <a:r>
+              <a:rPr lang="fr-FR" dirty="0"/>
+              <a:t>                //</a:t>
+            </a:r>
+            <a:r>
+              <a:rPr lang="fr-FR" dirty="0" err="1"/>
+              <a:t>Void</a:t>
+            </a:r>
+            <a:r>
+              <a:rPr lang="fr-FR" dirty="0"/>
+              <a:t> </a:t>
+            </a:r>
+            <a:r>
+              <a:rPr lang="fr-FR" dirty="0" err="1"/>
+              <a:t>method</a:t>
+            </a:r>
+            <a:r>
+              <a:rPr lang="fr-FR" dirty="0"/>
+              <a:t>()</a:t>
+            </a:r>
+          </a:p>
+          <a:p>
+            <a:r>
+              <a:rPr lang="fr-FR" dirty="0"/>
+              <a:t>                //Boolean </a:t>
+            </a:r>
+            <a:r>
+              <a:rPr lang="fr-FR" dirty="0" err="1"/>
+              <a:t>Equals</a:t>
+            </a:r>
+            <a:r>
+              <a:rPr lang="fr-FR" dirty="0"/>
+              <a:t>(</a:t>
+            </a:r>
+            <a:r>
+              <a:rPr lang="fr-FR" dirty="0" err="1"/>
+              <a:t>System.Object</a:t>
+            </a:r>
+            <a:r>
+              <a:rPr lang="fr-FR" dirty="0"/>
+              <a:t>)</a:t>
+            </a:r>
+          </a:p>
+          <a:p>
+            <a:r>
+              <a:rPr lang="fr-FR" dirty="0"/>
+              <a:t>                //Int32 </a:t>
+            </a:r>
+            <a:r>
+              <a:rPr lang="fr-FR" dirty="0" err="1"/>
+              <a:t>GetHashCode</a:t>
+            </a:r>
+            <a:r>
+              <a:rPr lang="fr-FR" dirty="0"/>
+              <a:t>()</a:t>
+            </a:r>
+          </a:p>
+          <a:p>
+            <a:r>
+              <a:rPr lang="fr-FR" dirty="0"/>
+              <a:t>                //</a:t>
+            </a:r>
+            <a:r>
+              <a:rPr lang="fr-FR" dirty="0" err="1"/>
+              <a:t>System.Type</a:t>
+            </a:r>
+            <a:r>
+              <a:rPr lang="fr-FR" dirty="0"/>
+              <a:t> </a:t>
+            </a:r>
+            <a:r>
+              <a:rPr lang="fr-FR" dirty="0" err="1"/>
+              <a:t>GetType</a:t>
+            </a:r>
+            <a:r>
+              <a:rPr lang="fr-FR" dirty="0"/>
+              <a:t>()</a:t>
+            </a:r>
+          </a:p>
+          <a:p>
+            <a:r>
+              <a:rPr lang="fr-FR" dirty="0"/>
+              <a:t>                //</a:t>
+            </a:r>
+            <a:r>
+              <a:rPr lang="fr-FR" dirty="0" err="1"/>
+              <a:t>System.String</a:t>
+            </a:r>
+            <a:r>
+              <a:rPr lang="fr-FR" dirty="0"/>
+              <a:t> </a:t>
+            </a:r>
+            <a:r>
+              <a:rPr lang="fr-FR" dirty="0" err="1"/>
+              <a:t>ToString</a:t>
+            </a:r>
+            <a:r>
+              <a:rPr lang="fr-FR" dirty="0"/>
+              <a:t>()</a:t>
+            </a:r>
+          </a:p>
+        </p:txBody>
+      </p:sp>
+      <p:sp>
+        <p:nvSpPr>
+          <p:cNvPr id="4" name="Espace réservé du numéro de diapositive 3"/>
+          <p:cNvSpPr>
+            <a:spLocks noGrp="1"/>
+          </p:cNvSpPr>
+          <p:nvPr>
+            <p:ph type="sldNum" sz="quarter" idx="5"/>
+          </p:nvPr>
+        </p:nvSpPr>
+        <p:spPr/>
+        <p:txBody>
+          <a:bodyPr/>
+          <a:lstStyle/>
+          <a:p>
+            <a:fld id="{06C65CB2-F9C5-48FF-A234-0BD63FBDD1F2}" type="slidenum">
+              <a:rPr lang="fr-FR" smtClean="0"/>
+              <a:t>3</a:t>
+            </a:fld>
+            <a:endParaRPr lang="fr-FR"/>
+          </a:p>
+        </p:txBody>
+      </p:sp>
+    </p:spTree>
+    <p:extLst>
+      <p:ext uri="{BB962C8B-B14F-4D97-AF65-F5344CB8AC3E}">
+        <p14:creationId xmlns:p14="http://schemas.microsoft.com/office/powerpoint/2010/main" val="1570783603"/>
+      </p:ext>
+    </p:extLst>
+  </p:cSld>
+  <p:clrMapOvr>
+    <a:masterClrMapping/>
+  </p:clrMapOvr>
+</p:notes>
 </file>
 
 <file path=ppt/slideLayouts/slideLayout1.xml><?xml version="1.0" encoding="utf-8"?>
@@ -340,11 +2022,12 @@
           <a:bodyPr/>
           <a:lstStyle/>
           <a:p>
-            <a:fld id="{11B134D8-D55D-45EA-8DDC-C1E1F664B674}" type="datetimeFigureOut">
-              <a:rPr lang="fr-FR" smtClean="0"/>
-              <a:t>21/01/2020</a:t>
+            <a:fld id="{B61BEF0D-F0BB-DE4B-95CE-6DB70DBA9567}" type="datetimeFigureOut">
+              <a:rPr lang="en-US" smtClean="0"/>
+              <a:pPr/>
+              <a:t>9/12/2020</a:t>
             </a:fld>
-            <a:endParaRPr lang="fr-FR"/>
+            <a:endParaRPr lang="en-US" dirty="0"/>
           </a:p>
         </p:txBody>
       </p:sp>
@@ -363,7 +2046,7 @@
           <a:bodyPr/>
           <a:lstStyle/>
           <a:p>
-            <a:endParaRPr lang="fr-FR"/>
+            <a:endParaRPr lang="en-US" dirty="0"/>
           </a:p>
         </p:txBody>
       </p:sp>
@@ -382,11 +2065,12 @@
           <a:bodyPr/>
           <a:lstStyle/>
           <a:p>
-            <a:fld id="{37AE3D2C-2C85-4068-99F7-929A09DCE9C4}" type="slidenum">
-              <a:rPr lang="fr-FR" smtClean="0"/>
+            <a:fld id="{D57F1E4F-1CFF-5643-939E-217C01CDF565}" type="slidenum">
+              <a:rPr lang="en-US" smtClean="0"/>
+              <a:pPr/>
               <a:t>‹N°›</a:t>
             </a:fld>
-            <a:endParaRPr lang="fr-FR"/>
+            <a:endParaRPr lang="en-US" dirty="0"/>
           </a:p>
         </p:txBody>
       </p:sp>
@@ -431,7 +2115,7 @@
     </p:spTree>
     <p:extLst>
       <p:ext uri="{BB962C8B-B14F-4D97-AF65-F5344CB8AC3E}">
-        <p14:creationId xmlns:p14="http://schemas.microsoft.com/office/powerpoint/2010/main" val="2222075889"/>
+        <p14:creationId xmlns:p14="http://schemas.microsoft.com/office/powerpoint/2010/main" val="329562457"/>
       </p:ext>
     </p:extLst>
   </p:cSld>
@@ -548,11 +2232,12 @@
           <a:bodyPr/>
           <a:lstStyle/>
           <a:p>
-            <a:fld id="{11B134D8-D55D-45EA-8DDC-C1E1F664B674}" type="datetimeFigureOut">
-              <a:rPr lang="fr-FR" smtClean="0"/>
-              <a:t>21/01/2020</a:t>
+            <a:fld id="{B61BEF0D-F0BB-DE4B-95CE-6DB70DBA9567}" type="datetimeFigureOut">
+              <a:rPr lang="en-US" smtClean="0"/>
+              <a:pPr/>
+              <a:t>9/12/2020</a:t>
             </a:fld>
-            <a:endParaRPr lang="fr-FR"/>
+            <a:endParaRPr lang="en-US" dirty="0"/>
           </a:p>
         </p:txBody>
       </p:sp>
@@ -571,7 +2256,7 @@
           <a:bodyPr/>
           <a:lstStyle/>
           <a:p>
-            <a:endParaRPr lang="fr-FR"/>
+            <a:endParaRPr lang="en-US" dirty="0"/>
           </a:p>
         </p:txBody>
       </p:sp>
@@ -590,18 +2275,19 @@
           <a:bodyPr/>
           <a:lstStyle/>
           <a:p>
-            <a:fld id="{37AE3D2C-2C85-4068-99F7-929A09DCE9C4}" type="slidenum">
-              <a:rPr lang="fr-FR" smtClean="0"/>
+            <a:fld id="{D57F1E4F-1CFF-5643-939E-217C01CDF565}" type="slidenum">
+              <a:rPr lang="en-US" smtClean="0"/>
+              <a:pPr/>
               <a:t>‹N°›</a:t>
             </a:fld>
-            <a:endParaRPr lang="fr-FR"/>
+            <a:endParaRPr lang="en-US" dirty="0"/>
           </a:p>
         </p:txBody>
       </p:sp>
     </p:spTree>
     <p:extLst>
       <p:ext uri="{BB962C8B-B14F-4D97-AF65-F5344CB8AC3E}">
-        <p14:creationId xmlns:p14="http://schemas.microsoft.com/office/powerpoint/2010/main" val="1240940982"/>
+        <p14:creationId xmlns:p14="http://schemas.microsoft.com/office/powerpoint/2010/main" val="841213702"/>
       </p:ext>
     </p:extLst>
   </p:cSld>
@@ -804,11 +2490,12 @@
           <a:bodyPr/>
           <a:lstStyle/>
           <a:p>
-            <a:fld id="{11B134D8-D55D-45EA-8DDC-C1E1F664B674}" type="datetimeFigureOut">
-              <a:rPr lang="fr-FR" smtClean="0"/>
-              <a:t>21/01/2020</a:t>
+            <a:fld id="{B61BEF0D-F0BB-DE4B-95CE-6DB70DBA9567}" type="datetimeFigureOut">
+              <a:rPr lang="en-US" smtClean="0"/>
+              <a:pPr/>
+              <a:t>9/12/2020</a:t>
             </a:fld>
-            <a:endParaRPr lang="fr-FR"/>
+            <a:endParaRPr lang="en-US" dirty="0"/>
           </a:p>
         </p:txBody>
       </p:sp>
@@ -827,7 +2514,7 @@
           <a:bodyPr/>
           <a:lstStyle/>
           <a:p>
-            <a:endParaRPr lang="fr-FR"/>
+            <a:endParaRPr lang="en-US" dirty="0"/>
           </a:p>
         </p:txBody>
       </p:sp>
@@ -846,18 +2533,19 @@
           <a:bodyPr/>
           <a:lstStyle/>
           <a:p>
-            <a:fld id="{37AE3D2C-2C85-4068-99F7-929A09DCE9C4}" type="slidenum">
-              <a:rPr lang="fr-FR" smtClean="0"/>
+            <a:fld id="{D57F1E4F-1CFF-5643-939E-217C01CDF565}" type="slidenum">
+              <a:rPr lang="en-US" smtClean="0"/>
+              <a:pPr/>
               <a:t>‹N°›</a:t>
             </a:fld>
-            <a:endParaRPr lang="fr-FR"/>
+            <a:endParaRPr lang="en-US" dirty="0"/>
           </a:p>
         </p:txBody>
       </p:sp>
     </p:spTree>
     <p:extLst>
       <p:ext uri="{BB962C8B-B14F-4D97-AF65-F5344CB8AC3E}">
-        <p14:creationId xmlns:p14="http://schemas.microsoft.com/office/powerpoint/2010/main" val="2777659177"/>
+        <p14:creationId xmlns:p14="http://schemas.microsoft.com/office/powerpoint/2010/main" val="181599728"/>
       </p:ext>
     </p:extLst>
   </p:cSld>
@@ -978,11 +2666,12 @@
           <a:bodyPr/>
           <a:lstStyle/>
           <a:p>
-            <a:fld id="{11B134D8-D55D-45EA-8DDC-C1E1F664B674}" type="datetimeFigureOut">
-              <a:rPr lang="fr-FR" smtClean="0"/>
-              <a:t>21/01/2020</a:t>
+            <a:fld id="{B61BEF0D-F0BB-DE4B-95CE-6DB70DBA9567}" type="datetimeFigureOut">
+              <a:rPr lang="en-US" smtClean="0"/>
+              <a:pPr/>
+              <a:t>9/12/2020</a:t>
             </a:fld>
-            <a:endParaRPr lang="fr-FR"/>
+            <a:endParaRPr lang="en-US" dirty="0"/>
           </a:p>
         </p:txBody>
       </p:sp>
@@ -1001,7 +2690,7 @@
           <a:bodyPr/>
           <a:lstStyle/>
           <a:p>
-            <a:endParaRPr lang="fr-FR"/>
+            <a:endParaRPr lang="en-US" dirty="0"/>
           </a:p>
         </p:txBody>
       </p:sp>
@@ -1020,18 +2709,19 @@
           <a:bodyPr/>
           <a:lstStyle/>
           <a:p>
-            <a:fld id="{37AE3D2C-2C85-4068-99F7-929A09DCE9C4}" type="slidenum">
-              <a:rPr lang="fr-FR" smtClean="0"/>
+            <a:fld id="{D57F1E4F-1CFF-5643-939E-217C01CDF565}" type="slidenum">
+              <a:rPr lang="en-US" smtClean="0"/>
+              <a:pPr/>
               <a:t>‹N°›</a:t>
             </a:fld>
-            <a:endParaRPr lang="fr-FR"/>
+            <a:endParaRPr lang="en-US" dirty="0"/>
           </a:p>
         </p:txBody>
       </p:sp>
     </p:spTree>
     <p:extLst>
       <p:ext uri="{BB962C8B-B14F-4D97-AF65-F5344CB8AC3E}">
-        <p14:creationId xmlns:p14="http://schemas.microsoft.com/office/powerpoint/2010/main" val="1768709728"/>
+        <p14:creationId xmlns:p14="http://schemas.microsoft.com/office/powerpoint/2010/main" val="2975613469"/>
       </p:ext>
     </p:extLst>
   </p:cSld>
@@ -1321,11 +3011,12 @@
           <a:bodyPr/>
           <a:lstStyle/>
           <a:p>
-            <a:fld id="{11B134D8-D55D-45EA-8DDC-C1E1F664B674}" type="datetimeFigureOut">
-              <a:rPr lang="fr-FR" smtClean="0"/>
-              <a:t>21/01/2020</a:t>
+            <a:fld id="{B61BEF0D-F0BB-DE4B-95CE-6DB70DBA9567}" type="datetimeFigureOut">
+              <a:rPr lang="en-US" smtClean="0"/>
+              <a:pPr/>
+              <a:t>9/12/2020</a:t>
             </a:fld>
-            <a:endParaRPr lang="fr-FR"/>
+            <a:endParaRPr lang="en-US" dirty="0"/>
           </a:p>
         </p:txBody>
       </p:sp>
@@ -1344,7 +3035,7 @@
           <a:bodyPr/>
           <a:lstStyle/>
           <a:p>
-            <a:endParaRPr lang="fr-FR"/>
+            <a:endParaRPr lang="en-US" dirty="0"/>
           </a:p>
         </p:txBody>
       </p:sp>
@@ -1363,11 +3054,12 @@
           <a:bodyPr/>
           <a:lstStyle/>
           <a:p>
-            <a:fld id="{37AE3D2C-2C85-4068-99F7-929A09DCE9C4}" type="slidenum">
-              <a:rPr lang="fr-FR" smtClean="0"/>
+            <a:fld id="{D57F1E4F-1CFF-5643-939E-217C01CDF565}" type="slidenum">
+              <a:rPr lang="en-US" smtClean="0"/>
+              <a:pPr/>
               <a:t>‹N°›</a:t>
             </a:fld>
-            <a:endParaRPr lang="fr-FR"/>
+            <a:endParaRPr lang="en-US" dirty="0"/>
           </a:p>
         </p:txBody>
       </p:sp>
@@ -1412,7 +3104,7 @@
     </p:spTree>
     <p:extLst>
       <p:ext uri="{BB962C8B-B14F-4D97-AF65-F5344CB8AC3E}">
-        <p14:creationId xmlns:p14="http://schemas.microsoft.com/office/powerpoint/2010/main" val="3839971613"/>
+        <p14:creationId xmlns:p14="http://schemas.microsoft.com/office/powerpoint/2010/main" val="2437316117"/>
       </p:ext>
     </p:extLst>
   </p:cSld>
@@ -1596,11 +3288,12 @@
           <a:bodyPr/>
           <a:lstStyle/>
           <a:p>
-            <a:fld id="{11B134D8-D55D-45EA-8DDC-C1E1F664B674}" type="datetimeFigureOut">
-              <a:rPr lang="fr-FR" smtClean="0"/>
-              <a:t>21/01/2020</a:t>
+            <a:fld id="{B61BEF0D-F0BB-DE4B-95CE-6DB70DBA9567}" type="datetimeFigureOut">
+              <a:rPr lang="en-US" smtClean="0"/>
+              <a:pPr/>
+              <a:t>9/12/2020</a:t>
             </a:fld>
-            <a:endParaRPr lang="fr-FR"/>
+            <a:endParaRPr lang="en-US" dirty="0"/>
           </a:p>
         </p:txBody>
       </p:sp>
@@ -1619,7 +3312,7 @@
           <a:bodyPr/>
           <a:lstStyle/>
           <a:p>
-            <a:endParaRPr lang="fr-FR"/>
+            <a:endParaRPr lang="en-US" dirty="0"/>
           </a:p>
         </p:txBody>
       </p:sp>
@@ -1638,29 +3331,25 @@
           <a:bodyPr/>
           <a:lstStyle/>
           <a:p>
-            <a:fld id="{37AE3D2C-2C85-4068-99F7-929A09DCE9C4}" type="slidenum">
-              <a:rPr lang="fr-FR" smtClean="0"/>
+            <a:fld id="{D57F1E4F-1CFF-5643-939E-217C01CDF565}" type="slidenum">
+              <a:rPr lang="en-US" smtClean="0"/>
+              <a:pPr/>
               <a:t>‹N°›</a:t>
             </a:fld>
-            <a:endParaRPr lang="fr-FR"/>
+            <a:endParaRPr lang="en-US" dirty="0"/>
           </a:p>
         </p:txBody>
       </p:sp>
     </p:spTree>
     <p:extLst>
       <p:ext uri="{BB962C8B-B14F-4D97-AF65-F5344CB8AC3E}">
-        <p14:creationId xmlns:p14="http://schemas.microsoft.com/office/powerpoint/2010/main" val="2076109164"/>
+        <p14:creationId xmlns:p14="http://schemas.microsoft.com/office/powerpoint/2010/main" val="3852694153"/>
       </p:ext>
     </p:extLst>
   </p:cSld>
   <p:clrMapOvr>
     <a:masterClrMapping/>
   </p:clrMapOvr>
-  <p:extLst>
-    <p:ext uri="{DCECCB84-F9BA-43D5-87BE-67443E8EF086}">
-      <p15:sldGuideLst xmlns:p15="http://schemas.microsoft.com/office/powerpoint/2012/main"/>
-    </p:ext>
-  </p:extLst>
 </p:sldLayout>
 </file>
 
@@ -1980,11 +3669,12 @@
           <a:bodyPr/>
           <a:lstStyle/>
           <a:p>
-            <a:fld id="{11B134D8-D55D-45EA-8DDC-C1E1F664B674}" type="datetimeFigureOut">
-              <a:rPr lang="fr-FR" smtClean="0"/>
-              <a:t>21/01/2020</a:t>
+            <a:fld id="{B61BEF0D-F0BB-DE4B-95CE-6DB70DBA9567}" type="datetimeFigureOut">
+              <a:rPr lang="en-US" smtClean="0"/>
+              <a:pPr/>
+              <a:t>9/12/2020</a:t>
             </a:fld>
-            <a:endParaRPr lang="fr-FR"/>
+            <a:endParaRPr lang="en-US" dirty="0"/>
           </a:p>
         </p:txBody>
       </p:sp>
@@ -2003,7 +3693,7 @@
           <a:bodyPr/>
           <a:lstStyle/>
           <a:p>
-            <a:endParaRPr lang="fr-FR"/>
+            <a:endParaRPr lang="en-US" dirty="0"/>
           </a:p>
         </p:txBody>
       </p:sp>
@@ -2022,29 +3712,25 @@
           <a:bodyPr/>
           <a:lstStyle/>
           <a:p>
-            <a:fld id="{37AE3D2C-2C85-4068-99F7-929A09DCE9C4}" type="slidenum">
-              <a:rPr lang="fr-FR" smtClean="0"/>
+            <a:fld id="{D57F1E4F-1CFF-5643-939E-217C01CDF565}" type="slidenum">
+              <a:rPr lang="en-US" smtClean="0"/>
+              <a:pPr/>
               <a:t>‹N°›</a:t>
             </a:fld>
-            <a:endParaRPr lang="fr-FR"/>
+            <a:endParaRPr lang="en-US" dirty="0"/>
           </a:p>
         </p:txBody>
       </p:sp>
     </p:spTree>
     <p:extLst>
       <p:ext uri="{BB962C8B-B14F-4D97-AF65-F5344CB8AC3E}">
-        <p14:creationId xmlns:p14="http://schemas.microsoft.com/office/powerpoint/2010/main" val="2767488498"/>
+        <p14:creationId xmlns:p14="http://schemas.microsoft.com/office/powerpoint/2010/main" val="2630684778"/>
       </p:ext>
     </p:extLst>
   </p:cSld>
   <p:clrMapOvr>
     <a:masterClrMapping/>
   </p:clrMapOvr>
-  <p:extLst>
-    <p:ext uri="{DCECCB84-F9BA-43D5-87BE-67443E8EF086}">
-      <p15:sldGuideLst xmlns:p15="http://schemas.microsoft.com/office/powerpoint/2012/main"/>
-    </p:ext>
-  </p:extLst>
 </p:sldLayout>
 </file>
 
@@ -2103,11 +3789,12 @@
           <a:bodyPr/>
           <a:lstStyle/>
           <a:p>
-            <a:fld id="{11B134D8-D55D-45EA-8DDC-C1E1F664B674}" type="datetimeFigureOut">
-              <a:rPr lang="fr-FR" smtClean="0"/>
-              <a:t>21/01/2020</a:t>
+            <a:fld id="{B61BEF0D-F0BB-DE4B-95CE-6DB70DBA9567}" type="datetimeFigureOut">
+              <a:rPr lang="en-US" smtClean="0"/>
+              <a:pPr/>
+              <a:t>9/12/2020</a:t>
             </a:fld>
-            <a:endParaRPr lang="fr-FR"/>
+            <a:endParaRPr lang="en-US" dirty="0"/>
           </a:p>
         </p:txBody>
       </p:sp>
@@ -2126,7 +3813,7 @@
           <a:bodyPr/>
           <a:lstStyle/>
           <a:p>
-            <a:endParaRPr lang="fr-FR"/>
+            <a:endParaRPr lang="en-US" dirty="0"/>
           </a:p>
         </p:txBody>
       </p:sp>
@@ -2145,18 +3832,19 @@
           <a:bodyPr/>
           <a:lstStyle/>
           <a:p>
-            <a:fld id="{37AE3D2C-2C85-4068-99F7-929A09DCE9C4}" type="slidenum">
-              <a:rPr lang="fr-FR" smtClean="0"/>
+            <a:fld id="{D57F1E4F-1CFF-5643-939E-217C01CDF565}" type="slidenum">
+              <a:rPr lang="en-US" smtClean="0"/>
+              <a:pPr/>
               <a:t>‹N°›</a:t>
             </a:fld>
-            <a:endParaRPr lang="fr-FR"/>
+            <a:endParaRPr lang="en-US" dirty="0"/>
           </a:p>
         </p:txBody>
       </p:sp>
     </p:spTree>
     <p:extLst>
       <p:ext uri="{BB962C8B-B14F-4D97-AF65-F5344CB8AC3E}">
-        <p14:creationId xmlns:p14="http://schemas.microsoft.com/office/powerpoint/2010/main" val="2402871362"/>
+        <p14:creationId xmlns:p14="http://schemas.microsoft.com/office/powerpoint/2010/main" val="474343160"/>
       </p:ext>
     </p:extLst>
   </p:cSld>
@@ -2274,11 +3962,12 @@
           <a:bodyPr/>
           <a:lstStyle/>
           <a:p>
-            <a:fld id="{11B134D8-D55D-45EA-8DDC-C1E1F664B674}" type="datetimeFigureOut">
-              <a:rPr lang="fr-FR" smtClean="0"/>
-              <a:t>21/01/2020</a:t>
+            <a:fld id="{B61BEF0D-F0BB-DE4B-95CE-6DB70DBA9567}" type="datetimeFigureOut">
+              <a:rPr lang="en-US" smtClean="0"/>
+              <a:pPr/>
+              <a:t>9/12/2020</a:t>
             </a:fld>
-            <a:endParaRPr lang="fr-FR"/>
+            <a:endParaRPr lang="en-US" dirty="0"/>
           </a:p>
         </p:txBody>
       </p:sp>
@@ -2305,7 +3994,7 @@
             </a:lvl1pPr>
           </a:lstStyle>
           <a:p>
-            <a:endParaRPr lang="fr-FR"/>
+            <a:endParaRPr lang="en-US" dirty="0"/>
           </a:p>
         </p:txBody>
       </p:sp>
@@ -2324,18 +4013,19 @@
           <a:bodyPr/>
           <a:lstStyle/>
           <a:p>
-            <a:fld id="{37AE3D2C-2C85-4068-99F7-929A09DCE9C4}" type="slidenum">
-              <a:rPr lang="fr-FR" smtClean="0"/>
+            <a:fld id="{D57F1E4F-1CFF-5643-939E-217C01CDF565}" type="slidenum">
+              <a:rPr lang="en-US" smtClean="0"/>
+              <a:pPr/>
               <a:t>‹N°›</a:t>
             </a:fld>
-            <a:endParaRPr lang="fr-FR"/>
+            <a:endParaRPr lang="en-US" dirty="0"/>
           </a:p>
         </p:txBody>
       </p:sp>
     </p:spTree>
     <p:extLst>
       <p:ext uri="{BB962C8B-B14F-4D97-AF65-F5344CB8AC3E}">
-        <p14:creationId xmlns:p14="http://schemas.microsoft.com/office/powerpoint/2010/main" val="273253917"/>
+        <p14:creationId xmlns:p14="http://schemas.microsoft.com/office/powerpoint/2010/main" val="1113349502"/>
       </p:ext>
     </p:extLst>
   </p:cSld>
@@ -2628,11 +4318,12 @@
             </a:lvl1pPr>
           </a:lstStyle>
           <a:p>
-            <a:fld id="{11B134D8-D55D-45EA-8DDC-C1E1F664B674}" type="datetimeFigureOut">
-              <a:rPr lang="fr-FR" smtClean="0"/>
-              <a:t>21/01/2020</a:t>
+            <a:fld id="{B61BEF0D-F0BB-DE4B-95CE-6DB70DBA9567}" type="datetimeFigureOut">
+              <a:rPr lang="en-US" smtClean="0"/>
+              <a:pPr/>
+              <a:t>9/12/2020</a:t>
             </a:fld>
-            <a:endParaRPr lang="fr-FR"/>
+            <a:endParaRPr lang="en-US" dirty="0"/>
           </a:p>
         </p:txBody>
       </p:sp>
@@ -2664,7 +4355,7 @@
             </a:lvl1pPr>
           </a:lstStyle>
           <a:p>
-            <a:endParaRPr lang="fr-FR"/>
+            <a:endParaRPr lang="en-US" dirty="0"/>
           </a:p>
         </p:txBody>
       </p:sp>
@@ -2691,29 +4382,25 @@
             </a:lvl1pPr>
           </a:lstStyle>
           <a:p>
-            <a:fld id="{37AE3D2C-2C85-4068-99F7-929A09DCE9C4}" type="slidenum">
-              <a:rPr lang="fr-FR" smtClean="0"/>
+            <a:fld id="{D57F1E4F-1CFF-5643-939E-217C01CDF565}" type="slidenum">
+              <a:rPr lang="en-US" smtClean="0"/>
+              <a:pPr/>
               <a:t>‹N°›</a:t>
             </a:fld>
-            <a:endParaRPr lang="fr-FR"/>
+            <a:endParaRPr lang="en-US" dirty="0"/>
           </a:p>
         </p:txBody>
       </p:sp>
     </p:spTree>
     <p:extLst>
       <p:ext uri="{BB962C8B-B14F-4D97-AF65-F5344CB8AC3E}">
-        <p14:creationId xmlns:p14="http://schemas.microsoft.com/office/powerpoint/2010/main" val="26670390"/>
+        <p14:creationId xmlns:p14="http://schemas.microsoft.com/office/powerpoint/2010/main" val="2870288989"/>
       </p:ext>
     </p:extLst>
   </p:cSld>
   <p:clrMapOvr>
     <a:masterClrMapping/>
   </p:clrMapOvr>
-  <p:extLst>
-    <p:ext uri="{DCECCB84-F9BA-43D5-87BE-67443E8EF086}">
-      <p15:sldGuideLst xmlns:p15="http://schemas.microsoft.com/office/powerpoint/2012/main"/>
-    </p:ext>
-  </p:extLst>
 </p:sldLayout>
 </file>
 
@@ -3015,11 +4702,12 @@
           <a:bodyPr/>
           <a:lstStyle/>
           <a:p>
-            <a:fld id="{11B134D8-D55D-45EA-8DDC-C1E1F664B674}" type="datetimeFigureOut">
-              <a:rPr lang="fr-FR" smtClean="0"/>
-              <a:t>21/01/2020</a:t>
+            <a:fld id="{B61BEF0D-F0BB-DE4B-95CE-6DB70DBA9567}" type="datetimeFigureOut">
+              <a:rPr lang="en-US" smtClean="0"/>
+              <a:pPr/>
+              <a:t>9/12/2020</a:t>
             </a:fld>
-            <a:endParaRPr lang="fr-FR"/>
+            <a:endParaRPr lang="en-US" dirty="0"/>
           </a:p>
         </p:txBody>
       </p:sp>
@@ -3038,7 +4726,7 @@
           <a:bodyPr/>
           <a:lstStyle/>
           <a:p>
-            <a:endParaRPr lang="fr-FR"/>
+            <a:endParaRPr lang="en-US" dirty="0"/>
           </a:p>
         </p:txBody>
       </p:sp>
@@ -3057,18 +4745,19 @@
           <a:bodyPr/>
           <a:lstStyle/>
           <a:p>
-            <a:fld id="{37AE3D2C-2C85-4068-99F7-929A09DCE9C4}" type="slidenum">
-              <a:rPr lang="fr-FR" smtClean="0"/>
+            <a:fld id="{D57F1E4F-1CFF-5643-939E-217C01CDF565}" type="slidenum">
+              <a:rPr lang="en-US" smtClean="0"/>
+              <a:pPr/>
               <a:t>‹N°›</a:t>
             </a:fld>
-            <a:endParaRPr lang="fr-FR"/>
+            <a:endParaRPr lang="en-US" dirty="0"/>
           </a:p>
         </p:txBody>
       </p:sp>
     </p:spTree>
     <p:extLst>
       <p:ext uri="{BB962C8B-B14F-4D97-AF65-F5344CB8AC3E}">
-        <p14:creationId xmlns:p14="http://schemas.microsoft.com/office/powerpoint/2010/main" val="1303304546"/>
+        <p14:creationId xmlns:p14="http://schemas.microsoft.com/office/powerpoint/2010/main" val="4235173711"/>
       </p:ext>
     </p:extLst>
   </p:cSld>
@@ -3304,7 +4993,7 @@
           <a:p>
             <a:fld id="{11B134D8-D55D-45EA-8DDC-C1E1F664B674}" type="datetimeFigureOut">
               <a:rPr lang="fr-FR" smtClean="0"/>
-              <a:t>21/01/2020</a:t>
+              <a:t>12/09/2020</a:t>
             </a:fld>
             <a:endParaRPr lang="fr-FR"/>
           </a:p>
@@ -3425,23 +5114,23 @@
     </p:spTree>
     <p:extLst>
       <p:ext uri="{BB962C8B-B14F-4D97-AF65-F5344CB8AC3E}">
-        <p14:creationId xmlns:p14="http://schemas.microsoft.com/office/powerpoint/2010/main" val="3641769234"/>
+        <p14:creationId xmlns:p14="http://schemas.microsoft.com/office/powerpoint/2010/main" val="374205578"/>
       </p:ext>
     </p:extLst>
   </p:cSld>
   <p:clrMap bg1="lt1" tx1="dk1" bg2="lt2" tx2="dk2" accent1="accent1" accent2="accent2" accent3="accent3" accent4="accent4" accent5="accent5" accent6="accent6" hlink="hlink" folHlink="folHlink"/>
   <p:sldLayoutIdLst>
-    <p:sldLayoutId id="2147484099" r:id="rId1"/>
-    <p:sldLayoutId id="2147484100" r:id="rId2"/>
-    <p:sldLayoutId id="2147484101" r:id="rId3"/>
-    <p:sldLayoutId id="2147484102" r:id="rId4"/>
-    <p:sldLayoutId id="2147484103" r:id="rId5"/>
-    <p:sldLayoutId id="2147484104" r:id="rId6"/>
-    <p:sldLayoutId id="2147484105" r:id="rId7"/>
-    <p:sldLayoutId id="2147484106" r:id="rId8"/>
-    <p:sldLayoutId id="2147484107" r:id="rId9"/>
-    <p:sldLayoutId id="2147484108" r:id="rId10"/>
-    <p:sldLayoutId id="2147484109" r:id="rId11"/>
+    <p:sldLayoutId id="2147484338" r:id="rId1"/>
+    <p:sldLayoutId id="2147484339" r:id="rId2"/>
+    <p:sldLayoutId id="2147484340" r:id="rId3"/>
+    <p:sldLayoutId id="2147484341" r:id="rId4"/>
+    <p:sldLayoutId id="2147484342" r:id="rId5"/>
+    <p:sldLayoutId id="2147484343" r:id="rId6"/>
+    <p:sldLayoutId id="2147484344" r:id="rId7"/>
+    <p:sldLayoutId id="2147484345" r:id="rId8"/>
+    <p:sldLayoutId id="2147484346" r:id="rId9"/>
+    <p:sldLayoutId id="2147484347" r:id="rId10"/>
+    <p:sldLayoutId id="2147484348" r:id="rId11"/>
   </p:sldLayoutIdLst>
   <p:txStyles>
     <p:titleStyle>
@@ -3808,11 +5497,6 @@
       </a:lvl9pPr>
     </p:otherStyle>
   </p:txStyles>
-  <p:extLst>
-    <p:ext uri="{27BBF7A9-308A-43DC-89C8-2F10F3537804}">
-      <p15:sldGuideLst xmlns:p15="http://schemas.microsoft.com/office/powerpoint/2012/main"/>
-    </p:ext>
-  </p:extLst>
 </p:sldMaster>
 </file>
 
@@ -3851,7 +5535,9 @@
         </p:nvSpPr>
         <p:spPr/>
         <p:txBody>
-          <a:bodyPr/>
+          <a:bodyPr>
+            <a:normAutofit/>
+          </a:bodyPr>
           <a:lstStyle/>
           <a:p>
             <a:r>
@@ -3946,16 +5632,12 @@
           <a:lstStyle/>
           <a:p>
             <a:r>
+              <a:rPr lang="fr-FR" dirty="0" err="1"/>
+              <a:t>Technical</a:t>
+            </a:r>
+            <a:r>
               <a:rPr lang="fr-FR" dirty="0"/>
-              <a:t>Goal (</a:t>
-            </a:r>
-            <a:r>
-              <a:rPr lang="fr-FR" dirty="0" err="1"/>
-              <a:t>technic</a:t>
-            </a:r>
-            <a:r>
-              <a:rPr lang="fr-FR" dirty="0"/>
-              <a:t>) of the exercice</a:t>
+              <a:t> goals of the exercice</a:t>
             </a:r>
           </a:p>
         </p:txBody>
@@ -3981,6 +5663,10 @@
           <a:bodyPr/>
           <a:lstStyle/>
           <a:p>
+            <a:pPr marL="457200" indent="-457200">
+              <a:buFont typeface="+mj-lt"/>
+              <a:buAutoNum type="arabicPeriod"/>
+            </a:pPr>
             <a:r>
               <a:rPr lang="en-US" dirty="0"/>
               <a:t>Work with </a:t>
@@ -3989,8 +5675,27 @@
               <a:rPr lang="en-US" b="1" dirty="0"/>
               <a:t>C# reflection</a:t>
             </a:r>
-          </a:p>
-          <a:p>
+            <a:endParaRPr lang="en-US" dirty="0"/>
+          </a:p>
+          <a:p>
+            <a:pPr marL="457200" indent="-457200">
+              <a:buFont typeface="+mj-lt"/>
+              <a:buAutoNum type="arabicPeriod"/>
+            </a:pPr>
+            <a:r>
+              <a:rPr lang="en-US" dirty="0"/>
+              <a:t> </a:t>
+            </a:r>
+            <a:r>
+              <a:rPr lang="en-US" b="1" dirty="0"/>
+              <a:t>C# attributes</a:t>
+            </a:r>
+          </a:p>
+          <a:p>
+            <a:pPr marL="457200" indent="-457200">
+              <a:buFont typeface="+mj-lt"/>
+              <a:buAutoNum type="arabicPeriod"/>
+            </a:pPr>
             <a:r>
               <a:rPr lang="en-US" dirty="0"/>
               <a:t>Use </a:t>
@@ -4005,6 +5710,10 @@
             </a:r>
           </a:p>
           <a:p>
+            <a:pPr marL="457200" indent="-457200">
+              <a:buFont typeface="+mj-lt"/>
+              <a:buAutoNum type="arabicPeriod"/>
+            </a:pPr>
             <a:r>
               <a:rPr lang="en-US" dirty="0"/>
               <a:t>Improve our abstraction </a:t>
@@ -4022,6 +5731,232 @@
   <p:clrMapOvr>
     <a:masterClrMapping/>
   </p:clrMapOvr>
+  <p:timing>
+    <p:tnLst>
+      <p:par>
+        <p:cTn id="1" dur="indefinite" restart="never" nodeType="tmRoot">
+          <p:childTnLst>
+            <p:seq concurrent="1" nextAc="seek">
+              <p:cTn id="2" dur="indefinite" nodeType="mainSeq">
+                <p:childTnLst>
+                  <p:par>
+                    <p:cTn id="3" fill="hold">
+                      <p:stCondLst>
+                        <p:cond delay="indefinite"/>
+                      </p:stCondLst>
+                      <p:childTnLst>
+                        <p:par>
+                          <p:cTn id="4" fill="hold">
+                            <p:stCondLst>
+                              <p:cond delay="0"/>
+                            </p:stCondLst>
+                            <p:childTnLst>
+                              <p:par>
+                                <p:cTn id="5" presetID="1" presetClass="entr" presetSubtype="0" fill="hold" nodeType="clickEffect">
+                                  <p:stCondLst>
+                                    <p:cond delay="0"/>
+                                  </p:stCondLst>
+                                  <p:childTnLst>
+                                    <p:set>
+                                      <p:cBhvr>
+                                        <p:cTn id="6" dur="1" fill="hold">
+                                          <p:stCondLst>
+                                            <p:cond delay="0"/>
+                                          </p:stCondLst>
+                                        </p:cTn>
+                                        <p:tgtEl>
+                                          <p:spTgt spid="3">
+                                            <p:txEl>
+                                              <p:pRg st="0" end="0"/>
+                                            </p:txEl>
+                                          </p:spTgt>
+                                        </p:tgtEl>
+                                        <p:attrNameLst>
+                                          <p:attrName>style.visibility</p:attrName>
+                                        </p:attrNameLst>
+                                      </p:cBhvr>
+                                      <p:to>
+                                        <p:strVal val="visible"/>
+                                      </p:to>
+                                    </p:set>
+                                  </p:childTnLst>
+                                </p:cTn>
+                              </p:par>
+                            </p:childTnLst>
+                          </p:cTn>
+                        </p:par>
+                      </p:childTnLst>
+                    </p:cTn>
+                  </p:par>
+                  <p:par>
+                    <p:cTn id="7" fill="hold">
+                      <p:stCondLst>
+                        <p:cond delay="indefinite"/>
+                      </p:stCondLst>
+                      <p:childTnLst>
+                        <p:par>
+                          <p:cTn id="8" fill="hold">
+                            <p:stCondLst>
+                              <p:cond delay="0"/>
+                            </p:stCondLst>
+                            <p:childTnLst>
+                              <p:par>
+                                <p:cTn id="9" presetID="1" presetClass="entr" presetSubtype="0" fill="hold" nodeType="clickEffect">
+                                  <p:stCondLst>
+                                    <p:cond delay="0"/>
+                                  </p:stCondLst>
+                                  <p:childTnLst>
+                                    <p:set>
+                                      <p:cBhvr>
+                                        <p:cTn id="10" dur="1" fill="hold">
+                                          <p:stCondLst>
+                                            <p:cond delay="0"/>
+                                          </p:stCondLst>
+                                        </p:cTn>
+                                        <p:tgtEl>
+                                          <p:spTgt spid="3">
+                                            <p:txEl>
+                                              <p:pRg st="1" end="1"/>
+                                            </p:txEl>
+                                          </p:spTgt>
+                                        </p:tgtEl>
+                                        <p:attrNameLst>
+                                          <p:attrName>style.visibility</p:attrName>
+                                        </p:attrNameLst>
+                                      </p:cBhvr>
+                                      <p:to>
+                                        <p:strVal val="visible"/>
+                                      </p:to>
+                                    </p:set>
+                                  </p:childTnLst>
+                                </p:cTn>
+                              </p:par>
+                            </p:childTnLst>
+                          </p:cTn>
+                        </p:par>
+                      </p:childTnLst>
+                    </p:cTn>
+                  </p:par>
+                  <p:par>
+                    <p:cTn id="11" fill="hold">
+                      <p:stCondLst>
+                        <p:cond delay="indefinite"/>
+                      </p:stCondLst>
+                      <p:childTnLst>
+                        <p:par>
+                          <p:cTn id="12" fill="hold">
+                            <p:stCondLst>
+                              <p:cond delay="0"/>
+                            </p:stCondLst>
+                            <p:childTnLst>
+                              <p:par>
+                                <p:cTn id="13" presetID="1" presetClass="entr" presetSubtype="0" fill="hold" nodeType="clickEffect">
+                                  <p:stCondLst>
+                                    <p:cond delay="0"/>
+                                  </p:stCondLst>
+                                  <p:childTnLst>
+                                    <p:set>
+                                      <p:cBhvr>
+                                        <p:cTn id="14" dur="1" fill="hold">
+                                          <p:stCondLst>
+                                            <p:cond delay="0"/>
+                                          </p:stCondLst>
+                                        </p:cTn>
+                                        <p:tgtEl>
+                                          <p:spTgt spid="3">
+                                            <p:txEl>
+                                              <p:pRg st="2" end="2"/>
+                                            </p:txEl>
+                                          </p:spTgt>
+                                        </p:tgtEl>
+                                        <p:attrNameLst>
+                                          <p:attrName>style.visibility</p:attrName>
+                                        </p:attrNameLst>
+                                      </p:cBhvr>
+                                      <p:to>
+                                        <p:strVal val="visible"/>
+                                      </p:to>
+                                    </p:set>
+                                  </p:childTnLst>
+                                </p:cTn>
+                              </p:par>
+                            </p:childTnLst>
+                          </p:cTn>
+                        </p:par>
+                      </p:childTnLst>
+                    </p:cTn>
+                  </p:par>
+                  <p:par>
+                    <p:cTn id="15" fill="hold">
+                      <p:stCondLst>
+                        <p:cond delay="indefinite"/>
+                      </p:stCondLst>
+                      <p:childTnLst>
+                        <p:par>
+                          <p:cTn id="16" fill="hold">
+                            <p:stCondLst>
+                              <p:cond delay="0"/>
+                            </p:stCondLst>
+                            <p:childTnLst>
+                              <p:par>
+                                <p:cTn id="17" presetID="1" presetClass="entr" presetSubtype="0" fill="hold" nodeType="clickEffect">
+                                  <p:stCondLst>
+                                    <p:cond delay="0"/>
+                                  </p:stCondLst>
+                                  <p:childTnLst>
+                                    <p:set>
+                                      <p:cBhvr>
+                                        <p:cTn id="18" dur="1" fill="hold">
+                                          <p:stCondLst>
+                                            <p:cond delay="0"/>
+                                          </p:stCondLst>
+                                        </p:cTn>
+                                        <p:tgtEl>
+                                          <p:spTgt spid="3">
+                                            <p:txEl>
+                                              <p:pRg st="3" end="3"/>
+                                            </p:txEl>
+                                          </p:spTgt>
+                                        </p:tgtEl>
+                                        <p:attrNameLst>
+                                          <p:attrName>style.visibility</p:attrName>
+                                        </p:attrNameLst>
+                                      </p:cBhvr>
+                                      <p:to>
+                                        <p:strVal val="visible"/>
+                                      </p:to>
+                                    </p:set>
+                                  </p:childTnLst>
+                                </p:cTn>
+                              </p:par>
+                            </p:childTnLst>
+                          </p:cTn>
+                        </p:par>
+                      </p:childTnLst>
+                    </p:cTn>
+                  </p:par>
+                </p:childTnLst>
+              </p:cTn>
+              <p:prevCondLst>
+                <p:cond evt="onPrev" delay="0">
+                  <p:tgtEl>
+                    <p:sldTgt/>
+                  </p:tgtEl>
+                </p:cond>
+              </p:prevCondLst>
+              <p:nextCondLst>
+                <p:cond evt="onNext" delay="0">
+                  <p:tgtEl>
+                    <p:sldTgt/>
+                  </p:tgtEl>
+                </p:cond>
+              </p:nextCondLst>
+            </p:seq>
+          </p:childTnLst>
+        </p:cTn>
+      </p:par>
+    </p:tnLst>
+  </p:timing>
 </p:sld>
 </file>
 
@@ -4086,11 +6021,20 @@
             <p:ph idx="1"/>
           </p:nvPr>
         </p:nvSpPr>
-        <p:spPr/>
+        <p:spPr>
+          <a:xfrm>
+            <a:off x="913774" y="1983075"/>
+            <a:ext cx="3449305" cy="1837240"/>
+          </a:xfrm>
+        </p:spPr>
         <p:txBody>
           <a:bodyPr/>
           <a:lstStyle/>
           <a:p>
+            <a:pPr marL="457200" indent="-457200">
+              <a:buFont typeface="+mj-lt"/>
+              <a:buAutoNum type="arabicPeriod"/>
+            </a:pPr>
             <a:r>
               <a:rPr lang="fr-FR" dirty="0" err="1"/>
               <a:t>typeof</a:t>
@@ -4101,6 +6045,10 @@
             </a:r>
           </a:p>
           <a:p>
+            <a:pPr marL="457200" indent="-457200">
+              <a:buFont typeface="+mj-lt"/>
+              <a:buAutoNum type="arabicPeriod"/>
+            </a:pPr>
             <a:r>
               <a:rPr lang="fr-FR" dirty="0" err="1"/>
               <a:t>GetType</a:t>
@@ -4114,6 +6062,909 @@
               <a:t>method</a:t>
             </a:r>
             <a:endParaRPr lang="fr-FR" dirty="0"/>
+          </a:p>
+        </p:txBody>
+      </p:sp>
+      <p:sp>
+        <p:nvSpPr>
+          <p:cNvPr id="8" name="ZoneTexte 7">
+            <a:extLst>
+              <a:ext uri="{FF2B5EF4-FFF2-40B4-BE49-F238E27FC236}">
+                <a16:creationId xmlns:a16="http://schemas.microsoft.com/office/drawing/2014/main" id="{CFC1416A-8408-4574-9B1B-1A4CD3283D51}"/>
+              </a:ext>
+            </a:extLst>
+          </p:cNvPr>
+          <p:cNvSpPr txBox="1"/>
+          <p:nvPr/>
+        </p:nvSpPr>
+        <p:spPr>
+          <a:xfrm>
+            <a:off x="484413" y="4079146"/>
+            <a:ext cx="6096000" cy="1477328"/>
+          </a:xfrm>
+          <a:prstGeom prst="rect">
+            <a:avLst/>
+          </a:prstGeom>
+          <a:noFill/>
+        </p:spPr>
+        <p:txBody>
+          <a:bodyPr wrap="square">
+            <a:spAutoFit/>
+          </a:bodyPr>
+          <a:lstStyle/>
+          <a:p>
+            <a:endParaRPr lang="fr-FR" sz="1800" dirty="0">
+              <a:solidFill>
+                <a:srgbClr val="000000"/>
+              </a:solidFill>
+              <a:latin typeface="Consolas" panose="020B0609020204030204" pitchFamily="49" charset="0"/>
+            </a:endParaRPr>
+          </a:p>
+          <a:p>
+            <a:r>
+              <a:rPr lang="fr-FR" sz="1800" dirty="0">
+                <a:solidFill>
+                  <a:srgbClr val="000000"/>
+                </a:solidFill>
+                <a:latin typeface="Consolas" panose="020B0609020204030204" pitchFamily="49" charset="0"/>
+              </a:rPr>
+              <a:t>    </a:t>
+            </a:r>
+            <a:r>
+              <a:rPr lang="fr-FR" sz="1800" dirty="0">
+                <a:solidFill>
+                  <a:srgbClr val="0000FF"/>
+                </a:solidFill>
+                <a:latin typeface="Consolas" panose="020B0609020204030204" pitchFamily="49" charset="0"/>
+              </a:rPr>
+              <a:t>public</a:t>
+            </a:r>
+            <a:r>
+              <a:rPr lang="fr-FR" sz="1800" dirty="0">
+                <a:solidFill>
+                  <a:srgbClr val="000000"/>
+                </a:solidFill>
+                <a:latin typeface="Consolas" panose="020B0609020204030204" pitchFamily="49" charset="0"/>
+              </a:rPr>
+              <a:t> </a:t>
+            </a:r>
+            <a:r>
+              <a:rPr lang="fr-FR" sz="1800" dirty="0">
+                <a:solidFill>
+                  <a:srgbClr val="0000FF"/>
+                </a:solidFill>
+                <a:latin typeface="Consolas" panose="020B0609020204030204" pitchFamily="49" charset="0"/>
+              </a:rPr>
+              <a:t>class</a:t>
+            </a:r>
+            <a:r>
+              <a:rPr lang="fr-FR" sz="1800" dirty="0">
+                <a:solidFill>
+                  <a:srgbClr val="000000"/>
+                </a:solidFill>
+                <a:latin typeface="Consolas" panose="020B0609020204030204" pitchFamily="49" charset="0"/>
+              </a:rPr>
+              <a:t> </a:t>
+            </a:r>
+            <a:r>
+              <a:rPr lang="fr-FR" sz="1800" dirty="0">
+                <a:solidFill>
+                  <a:srgbClr val="2B91AF"/>
+                </a:solidFill>
+                <a:latin typeface="Consolas" panose="020B0609020204030204" pitchFamily="49" charset="0"/>
+              </a:rPr>
+              <a:t>A</a:t>
+            </a:r>
+            <a:r>
+              <a:rPr lang="fr-FR" sz="1800" dirty="0">
+                <a:solidFill>
+                  <a:srgbClr val="000000"/>
+                </a:solidFill>
+                <a:latin typeface="Consolas" panose="020B0609020204030204" pitchFamily="49" charset="0"/>
+              </a:rPr>
+              <a:t> </a:t>
+            </a:r>
+          </a:p>
+          <a:p>
+            <a:r>
+              <a:rPr lang="fr-FR" sz="1800" dirty="0">
+                <a:solidFill>
+                  <a:srgbClr val="000000"/>
+                </a:solidFill>
+                <a:latin typeface="Consolas" panose="020B0609020204030204" pitchFamily="49" charset="0"/>
+              </a:rPr>
+              <a:t>    {</a:t>
+            </a:r>
+          </a:p>
+          <a:p>
+            <a:r>
+              <a:rPr lang="fr-FR" sz="1800" dirty="0">
+                <a:solidFill>
+                  <a:srgbClr val="000000"/>
+                </a:solidFill>
+                <a:latin typeface="Consolas" panose="020B0609020204030204" pitchFamily="49" charset="0"/>
+              </a:rPr>
+              <a:t>        </a:t>
+            </a:r>
+            <a:r>
+              <a:rPr lang="fr-FR" sz="1800" dirty="0">
+                <a:solidFill>
+                  <a:srgbClr val="0000FF"/>
+                </a:solidFill>
+                <a:latin typeface="Consolas" panose="020B0609020204030204" pitchFamily="49" charset="0"/>
+              </a:rPr>
+              <a:t>public</a:t>
+            </a:r>
+            <a:r>
+              <a:rPr lang="fr-FR" sz="1800" dirty="0">
+                <a:solidFill>
+                  <a:srgbClr val="000000"/>
+                </a:solidFill>
+                <a:latin typeface="Consolas" panose="020B0609020204030204" pitchFamily="49" charset="0"/>
+              </a:rPr>
+              <a:t> </a:t>
+            </a:r>
+            <a:r>
+              <a:rPr lang="fr-FR" sz="1800" dirty="0" err="1">
+                <a:solidFill>
+                  <a:srgbClr val="0000FF"/>
+                </a:solidFill>
+                <a:latin typeface="Consolas" panose="020B0609020204030204" pitchFamily="49" charset="0"/>
+              </a:rPr>
+              <a:t>void</a:t>
+            </a:r>
+            <a:r>
+              <a:rPr lang="fr-FR" sz="1800" dirty="0">
+                <a:solidFill>
+                  <a:srgbClr val="000000"/>
+                </a:solidFill>
+                <a:latin typeface="Consolas" panose="020B0609020204030204" pitchFamily="49" charset="0"/>
+              </a:rPr>
+              <a:t> </a:t>
+            </a:r>
+            <a:r>
+              <a:rPr lang="fr-FR" sz="1800" dirty="0" err="1">
+                <a:solidFill>
+                  <a:srgbClr val="000000"/>
+                </a:solidFill>
+                <a:latin typeface="Consolas" panose="020B0609020204030204" pitchFamily="49" charset="0"/>
+              </a:rPr>
+              <a:t>method</a:t>
+            </a:r>
+            <a:r>
+              <a:rPr lang="fr-FR" sz="1800" dirty="0">
+                <a:solidFill>
+                  <a:srgbClr val="000000"/>
+                </a:solidFill>
+                <a:latin typeface="Consolas" panose="020B0609020204030204" pitchFamily="49" charset="0"/>
+              </a:rPr>
+              <a:t>() { }</a:t>
+            </a:r>
+          </a:p>
+          <a:p>
+            <a:r>
+              <a:rPr lang="fr-FR" sz="1800" dirty="0">
+                <a:solidFill>
+                  <a:srgbClr val="000000"/>
+                </a:solidFill>
+                <a:latin typeface="Consolas" panose="020B0609020204030204" pitchFamily="49" charset="0"/>
+              </a:rPr>
+              <a:t>    }</a:t>
+            </a:r>
+            <a:endParaRPr lang="fr-FR" dirty="0"/>
+          </a:p>
+        </p:txBody>
+      </p:sp>
+      <p:sp>
+        <p:nvSpPr>
+          <p:cNvPr id="14" name="ZoneTexte 13">
+            <a:extLst>
+              <a:ext uri="{FF2B5EF4-FFF2-40B4-BE49-F238E27FC236}">
+                <a16:creationId xmlns:a16="http://schemas.microsoft.com/office/drawing/2014/main" id="{1ED82088-FF4C-4E5A-B7A6-D80B92606280}"/>
+              </a:ext>
+            </a:extLst>
+          </p:cNvPr>
+          <p:cNvSpPr txBox="1"/>
+          <p:nvPr/>
+        </p:nvSpPr>
+        <p:spPr>
+          <a:xfrm>
+            <a:off x="5015590" y="3392145"/>
+            <a:ext cx="6866165" cy="2585323"/>
+          </a:xfrm>
+          <a:prstGeom prst="rect">
+            <a:avLst/>
+          </a:prstGeom>
+          <a:noFill/>
+        </p:spPr>
+        <p:txBody>
+          <a:bodyPr wrap="square">
+            <a:spAutoFit/>
+          </a:bodyPr>
+          <a:lstStyle/>
+          <a:p>
+            <a:r>
+              <a:rPr lang="fr-FR" sz="1800" dirty="0">
+                <a:solidFill>
+                  <a:srgbClr val="0000FF"/>
+                </a:solidFill>
+                <a:latin typeface="Consolas" panose="020B0609020204030204" pitchFamily="49" charset="0"/>
+              </a:rPr>
+              <a:t>var</a:t>
+            </a:r>
+            <a:r>
+              <a:rPr lang="fr-FR" sz="1800" dirty="0">
+                <a:solidFill>
+                  <a:srgbClr val="000000"/>
+                </a:solidFill>
+                <a:latin typeface="Consolas" panose="020B0609020204030204" pitchFamily="49" charset="0"/>
+              </a:rPr>
+              <a:t> </a:t>
+            </a:r>
+            <a:r>
+              <a:rPr lang="fr-FR" sz="1800" dirty="0" err="1">
+                <a:solidFill>
+                  <a:srgbClr val="000000"/>
+                </a:solidFill>
+                <a:latin typeface="Consolas" panose="020B0609020204030204" pitchFamily="49" charset="0"/>
+              </a:rPr>
+              <a:t>list</a:t>
+            </a:r>
+            <a:r>
+              <a:rPr lang="fr-FR" sz="1800" dirty="0">
+                <a:solidFill>
+                  <a:srgbClr val="000000"/>
+                </a:solidFill>
+                <a:latin typeface="Consolas" panose="020B0609020204030204" pitchFamily="49" charset="0"/>
+              </a:rPr>
+              <a:t> = typeA1.GetMethods();</a:t>
+            </a:r>
+          </a:p>
+          <a:p>
+            <a:r>
+              <a:rPr lang="fr-FR" sz="1800" dirty="0" err="1">
+                <a:solidFill>
+                  <a:srgbClr val="0000FF"/>
+                </a:solidFill>
+                <a:latin typeface="Consolas" panose="020B0609020204030204" pitchFamily="49" charset="0"/>
+              </a:rPr>
+              <a:t>foreach</a:t>
+            </a:r>
+            <a:r>
+              <a:rPr lang="fr-FR" sz="1800" dirty="0">
+                <a:solidFill>
+                  <a:srgbClr val="000000"/>
+                </a:solidFill>
+                <a:latin typeface="Consolas" panose="020B0609020204030204" pitchFamily="49" charset="0"/>
+              </a:rPr>
+              <a:t> (var item </a:t>
+            </a:r>
+            <a:r>
+              <a:rPr lang="fr-FR" sz="1800" dirty="0">
+                <a:solidFill>
+                  <a:srgbClr val="0000FF"/>
+                </a:solidFill>
+                <a:latin typeface="Consolas" panose="020B0609020204030204" pitchFamily="49" charset="0"/>
+              </a:rPr>
+              <a:t>in</a:t>
+            </a:r>
+            <a:r>
+              <a:rPr lang="fr-FR" sz="1800" dirty="0">
+                <a:solidFill>
+                  <a:srgbClr val="000000"/>
+                </a:solidFill>
+                <a:latin typeface="Consolas" panose="020B0609020204030204" pitchFamily="49" charset="0"/>
+              </a:rPr>
+              <a:t> </a:t>
+            </a:r>
+            <a:r>
+              <a:rPr lang="fr-FR" sz="1800" dirty="0" err="1">
+                <a:solidFill>
+                  <a:srgbClr val="000000"/>
+                </a:solidFill>
+                <a:latin typeface="Consolas" panose="020B0609020204030204" pitchFamily="49" charset="0"/>
+              </a:rPr>
+              <a:t>list</a:t>
+            </a:r>
+            <a:r>
+              <a:rPr lang="fr-FR" sz="1800" dirty="0">
+                <a:solidFill>
+                  <a:srgbClr val="000000"/>
+                </a:solidFill>
+                <a:latin typeface="Consolas" panose="020B0609020204030204" pitchFamily="49" charset="0"/>
+              </a:rPr>
+              <a:t>)</a:t>
+            </a:r>
+          </a:p>
+          <a:p>
+            <a:r>
+              <a:rPr lang="fr-FR" sz="1800" dirty="0">
+                <a:solidFill>
+                  <a:srgbClr val="000000"/>
+                </a:solidFill>
+                <a:latin typeface="Consolas" panose="020B0609020204030204" pitchFamily="49" charset="0"/>
+              </a:rPr>
+              <a:t>    </a:t>
+            </a:r>
+            <a:r>
+              <a:rPr lang="fr-FR" dirty="0" err="1">
+                <a:solidFill>
+                  <a:srgbClr val="2B91AF"/>
+                </a:solidFill>
+                <a:latin typeface="Consolas" panose="020B0609020204030204" pitchFamily="49" charset="0"/>
+              </a:rPr>
+              <a:t>Console</a:t>
+            </a:r>
+            <a:r>
+              <a:rPr lang="fr-FR" sz="1800" dirty="0" err="1">
+                <a:solidFill>
+                  <a:srgbClr val="000000"/>
+                </a:solidFill>
+                <a:latin typeface="Consolas" panose="020B0609020204030204" pitchFamily="49" charset="0"/>
+              </a:rPr>
+              <a:t>.WriteLine</a:t>
+            </a:r>
+            <a:r>
+              <a:rPr lang="fr-FR" sz="1800" dirty="0">
+                <a:solidFill>
+                  <a:srgbClr val="000000"/>
+                </a:solidFill>
+                <a:latin typeface="Consolas" panose="020B0609020204030204" pitchFamily="49" charset="0"/>
+              </a:rPr>
+              <a:t>(item);</a:t>
+            </a:r>
+          </a:p>
+          <a:p>
+            <a:r>
+              <a:rPr lang="en-US" sz="1800" dirty="0">
+                <a:solidFill>
+                  <a:srgbClr val="008000"/>
+                </a:solidFill>
+                <a:latin typeface="Consolas" panose="020B0609020204030204" pitchFamily="49" charset="0"/>
+              </a:rPr>
+              <a:t>// Display the 5 following methods :</a:t>
+            </a:r>
+            <a:endParaRPr lang="en-US" sz="1800" dirty="0">
+              <a:solidFill>
+                <a:srgbClr val="000000"/>
+              </a:solidFill>
+              <a:latin typeface="Consolas" panose="020B0609020204030204" pitchFamily="49" charset="0"/>
+            </a:endParaRPr>
+          </a:p>
+          <a:p>
+            <a:r>
+              <a:rPr lang="fr-FR" sz="1800" dirty="0">
+                <a:solidFill>
+                  <a:srgbClr val="000000"/>
+                </a:solidFill>
+                <a:latin typeface="Consolas" panose="020B0609020204030204" pitchFamily="49" charset="0"/>
+              </a:rPr>
+              <a:t>    </a:t>
+            </a:r>
+            <a:r>
+              <a:rPr lang="fr-FR" sz="1800" dirty="0">
+                <a:solidFill>
+                  <a:srgbClr val="008000"/>
+                </a:solidFill>
+                <a:latin typeface="Consolas" panose="020B0609020204030204" pitchFamily="49" charset="0"/>
+              </a:rPr>
+              <a:t>//</a:t>
+            </a:r>
+            <a:r>
+              <a:rPr lang="fr-FR" sz="1800" dirty="0" err="1">
+                <a:solidFill>
+                  <a:srgbClr val="008000"/>
+                </a:solidFill>
+                <a:latin typeface="Consolas" panose="020B0609020204030204" pitchFamily="49" charset="0"/>
+              </a:rPr>
+              <a:t>Void</a:t>
+            </a:r>
+            <a:r>
+              <a:rPr lang="fr-FR" sz="1800" dirty="0">
+                <a:solidFill>
+                  <a:srgbClr val="008000"/>
+                </a:solidFill>
+                <a:latin typeface="Consolas" panose="020B0609020204030204" pitchFamily="49" charset="0"/>
+              </a:rPr>
+              <a:t> </a:t>
+            </a:r>
+            <a:r>
+              <a:rPr lang="fr-FR" sz="1800" dirty="0" err="1">
+                <a:solidFill>
+                  <a:srgbClr val="008000"/>
+                </a:solidFill>
+                <a:latin typeface="Consolas" panose="020B0609020204030204" pitchFamily="49" charset="0"/>
+              </a:rPr>
+              <a:t>method</a:t>
+            </a:r>
+            <a:r>
+              <a:rPr lang="fr-FR" sz="1800" dirty="0">
+                <a:solidFill>
+                  <a:srgbClr val="008000"/>
+                </a:solidFill>
+                <a:latin typeface="Consolas" panose="020B0609020204030204" pitchFamily="49" charset="0"/>
+              </a:rPr>
+              <a:t>()</a:t>
+            </a:r>
+            <a:endParaRPr lang="fr-FR" sz="1800" dirty="0">
+              <a:solidFill>
+                <a:srgbClr val="000000"/>
+              </a:solidFill>
+              <a:latin typeface="Consolas" panose="020B0609020204030204" pitchFamily="49" charset="0"/>
+            </a:endParaRPr>
+          </a:p>
+          <a:p>
+            <a:r>
+              <a:rPr lang="fr-FR" sz="1800" dirty="0">
+                <a:solidFill>
+                  <a:srgbClr val="000000"/>
+                </a:solidFill>
+                <a:latin typeface="Consolas" panose="020B0609020204030204" pitchFamily="49" charset="0"/>
+              </a:rPr>
+              <a:t>    </a:t>
+            </a:r>
+            <a:r>
+              <a:rPr lang="fr-FR" sz="1800" dirty="0">
+                <a:solidFill>
+                  <a:srgbClr val="008000"/>
+                </a:solidFill>
+                <a:latin typeface="Consolas" panose="020B0609020204030204" pitchFamily="49" charset="0"/>
+              </a:rPr>
+              <a:t>//Boolean </a:t>
+            </a:r>
+            <a:r>
+              <a:rPr lang="fr-FR" sz="1800" dirty="0" err="1">
+                <a:solidFill>
+                  <a:srgbClr val="008000"/>
+                </a:solidFill>
+                <a:latin typeface="Consolas" panose="020B0609020204030204" pitchFamily="49" charset="0"/>
+              </a:rPr>
+              <a:t>Equals</a:t>
+            </a:r>
+            <a:r>
+              <a:rPr lang="fr-FR" sz="1800" dirty="0">
+                <a:solidFill>
+                  <a:srgbClr val="008000"/>
+                </a:solidFill>
+                <a:latin typeface="Consolas" panose="020B0609020204030204" pitchFamily="49" charset="0"/>
+              </a:rPr>
+              <a:t>(</a:t>
+            </a:r>
+            <a:r>
+              <a:rPr lang="fr-FR" sz="1800" dirty="0" err="1">
+                <a:solidFill>
+                  <a:srgbClr val="008000"/>
+                </a:solidFill>
+                <a:latin typeface="Consolas" panose="020B0609020204030204" pitchFamily="49" charset="0"/>
+              </a:rPr>
+              <a:t>System.Object</a:t>
+            </a:r>
+            <a:r>
+              <a:rPr lang="fr-FR" sz="1800" dirty="0">
+                <a:solidFill>
+                  <a:srgbClr val="008000"/>
+                </a:solidFill>
+                <a:latin typeface="Consolas" panose="020B0609020204030204" pitchFamily="49" charset="0"/>
+              </a:rPr>
+              <a:t>)</a:t>
+            </a:r>
+            <a:endParaRPr lang="fr-FR" sz="1800" dirty="0">
+              <a:solidFill>
+                <a:srgbClr val="000000"/>
+              </a:solidFill>
+              <a:latin typeface="Consolas" panose="020B0609020204030204" pitchFamily="49" charset="0"/>
+            </a:endParaRPr>
+          </a:p>
+          <a:p>
+            <a:r>
+              <a:rPr lang="fr-FR" sz="1800" dirty="0">
+                <a:solidFill>
+                  <a:srgbClr val="000000"/>
+                </a:solidFill>
+                <a:latin typeface="Consolas" panose="020B0609020204030204" pitchFamily="49" charset="0"/>
+              </a:rPr>
+              <a:t>    </a:t>
+            </a:r>
+            <a:r>
+              <a:rPr lang="fr-FR" sz="1800" dirty="0">
+                <a:solidFill>
+                  <a:srgbClr val="008000"/>
+                </a:solidFill>
+                <a:latin typeface="Consolas" panose="020B0609020204030204" pitchFamily="49" charset="0"/>
+              </a:rPr>
+              <a:t>//Int32 </a:t>
+            </a:r>
+            <a:r>
+              <a:rPr lang="fr-FR" sz="1800" dirty="0" err="1">
+                <a:solidFill>
+                  <a:srgbClr val="008000"/>
+                </a:solidFill>
+                <a:latin typeface="Consolas" panose="020B0609020204030204" pitchFamily="49" charset="0"/>
+              </a:rPr>
+              <a:t>GetHashCode</a:t>
+            </a:r>
+            <a:r>
+              <a:rPr lang="fr-FR" sz="1800" dirty="0">
+                <a:solidFill>
+                  <a:srgbClr val="008000"/>
+                </a:solidFill>
+                <a:latin typeface="Consolas" panose="020B0609020204030204" pitchFamily="49" charset="0"/>
+              </a:rPr>
+              <a:t>()</a:t>
+            </a:r>
+            <a:endParaRPr lang="fr-FR" sz="1800" dirty="0">
+              <a:solidFill>
+                <a:srgbClr val="000000"/>
+              </a:solidFill>
+              <a:latin typeface="Consolas" panose="020B0609020204030204" pitchFamily="49" charset="0"/>
+            </a:endParaRPr>
+          </a:p>
+          <a:p>
+            <a:r>
+              <a:rPr lang="fr-FR" sz="1800" dirty="0">
+                <a:solidFill>
+                  <a:srgbClr val="000000"/>
+                </a:solidFill>
+                <a:latin typeface="Consolas" panose="020B0609020204030204" pitchFamily="49" charset="0"/>
+              </a:rPr>
+              <a:t>    </a:t>
+            </a:r>
+            <a:r>
+              <a:rPr lang="fr-FR" sz="1800" dirty="0">
+                <a:solidFill>
+                  <a:srgbClr val="008000"/>
+                </a:solidFill>
+                <a:latin typeface="Consolas" panose="020B0609020204030204" pitchFamily="49" charset="0"/>
+              </a:rPr>
+              <a:t>//</a:t>
+            </a:r>
+            <a:r>
+              <a:rPr lang="fr-FR" sz="1800" dirty="0" err="1">
+                <a:solidFill>
+                  <a:srgbClr val="008000"/>
+                </a:solidFill>
+                <a:latin typeface="Consolas" panose="020B0609020204030204" pitchFamily="49" charset="0"/>
+              </a:rPr>
+              <a:t>System.Type</a:t>
+            </a:r>
+            <a:r>
+              <a:rPr lang="fr-FR" sz="1800" dirty="0">
+                <a:solidFill>
+                  <a:srgbClr val="008000"/>
+                </a:solidFill>
+                <a:latin typeface="Consolas" panose="020B0609020204030204" pitchFamily="49" charset="0"/>
+              </a:rPr>
+              <a:t> </a:t>
+            </a:r>
+            <a:r>
+              <a:rPr lang="fr-FR" sz="1800" dirty="0" err="1">
+                <a:solidFill>
+                  <a:srgbClr val="008000"/>
+                </a:solidFill>
+                <a:latin typeface="Consolas" panose="020B0609020204030204" pitchFamily="49" charset="0"/>
+              </a:rPr>
+              <a:t>GetType</a:t>
+            </a:r>
+            <a:r>
+              <a:rPr lang="fr-FR" sz="1800" dirty="0">
+                <a:solidFill>
+                  <a:srgbClr val="008000"/>
+                </a:solidFill>
+                <a:latin typeface="Consolas" panose="020B0609020204030204" pitchFamily="49" charset="0"/>
+              </a:rPr>
+              <a:t>()</a:t>
+            </a:r>
+            <a:endParaRPr lang="fr-FR" sz="1800" dirty="0">
+              <a:solidFill>
+                <a:srgbClr val="000000"/>
+              </a:solidFill>
+              <a:latin typeface="Consolas" panose="020B0609020204030204" pitchFamily="49" charset="0"/>
+            </a:endParaRPr>
+          </a:p>
+          <a:p>
+            <a:r>
+              <a:rPr lang="fr-FR" sz="1800" dirty="0">
+                <a:solidFill>
+                  <a:srgbClr val="000000"/>
+                </a:solidFill>
+                <a:latin typeface="Consolas" panose="020B0609020204030204" pitchFamily="49" charset="0"/>
+              </a:rPr>
+              <a:t>    </a:t>
+            </a:r>
+            <a:r>
+              <a:rPr lang="fr-FR" sz="1800" dirty="0">
+                <a:solidFill>
+                  <a:srgbClr val="008000"/>
+                </a:solidFill>
+                <a:latin typeface="Consolas" panose="020B0609020204030204" pitchFamily="49" charset="0"/>
+              </a:rPr>
+              <a:t>//</a:t>
+            </a:r>
+            <a:r>
+              <a:rPr lang="fr-FR" sz="1800" dirty="0" err="1">
+                <a:solidFill>
+                  <a:srgbClr val="008000"/>
+                </a:solidFill>
+                <a:latin typeface="Consolas" panose="020B0609020204030204" pitchFamily="49" charset="0"/>
+              </a:rPr>
+              <a:t>System.String</a:t>
+            </a:r>
+            <a:r>
+              <a:rPr lang="fr-FR" sz="1800" dirty="0">
+                <a:solidFill>
+                  <a:srgbClr val="008000"/>
+                </a:solidFill>
+                <a:latin typeface="Consolas" panose="020B0609020204030204" pitchFamily="49" charset="0"/>
+              </a:rPr>
+              <a:t> </a:t>
+            </a:r>
+            <a:r>
+              <a:rPr lang="fr-FR" sz="1800" dirty="0" err="1">
+                <a:solidFill>
+                  <a:srgbClr val="008000"/>
+                </a:solidFill>
+                <a:latin typeface="Consolas" panose="020B0609020204030204" pitchFamily="49" charset="0"/>
+              </a:rPr>
+              <a:t>ToString</a:t>
+            </a:r>
+            <a:r>
+              <a:rPr lang="fr-FR" sz="1800" dirty="0">
+                <a:solidFill>
+                  <a:srgbClr val="008000"/>
+                </a:solidFill>
+                <a:latin typeface="Consolas" panose="020B0609020204030204" pitchFamily="49" charset="0"/>
+              </a:rPr>
+              <a:t>()</a:t>
+            </a:r>
+            <a:endParaRPr lang="fr-FR" sz="1800" dirty="0">
+              <a:solidFill>
+                <a:srgbClr val="000000"/>
+              </a:solidFill>
+              <a:latin typeface="Consolas" panose="020B0609020204030204" pitchFamily="49" charset="0"/>
+            </a:endParaRPr>
+          </a:p>
+        </p:txBody>
+      </p:sp>
+      <p:sp>
+        <p:nvSpPr>
+          <p:cNvPr id="16" name="ZoneTexte 15">
+            <a:extLst>
+              <a:ext uri="{FF2B5EF4-FFF2-40B4-BE49-F238E27FC236}">
+                <a16:creationId xmlns:a16="http://schemas.microsoft.com/office/drawing/2014/main" id="{497D21A3-4C24-4BF1-A555-3D97CB1CF9CF}"/>
+              </a:ext>
+            </a:extLst>
+          </p:cNvPr>
+          <p:cNvSpPr txBox="1"/>
+          <p:nvPr/>
+        </p:nvSpPr>
+        <p:spPr>
+          <a:xfrm>
+            <a:off x="5015590" y="1830011"/>
+            <a:ext cx="6866165" cy="1477328"/>
+          </a:xfrm>
+          <a:prstGeom prst="rect">
+            <a:avLst/>
+          </a:prstGeom>
+          <a:noFill/>
+        </p:spPr>
+        <p:txBody>
+          <a:bodyPr wrap="square">
+            <a:spAutoFit/>
+          </a:bodyPr>
+          <a:lstStyle/>
+          <a:p>
+            <a:r>
+              <a:rPr lang="fr-FR" dirty="0">
+                <a:solidFill>
+                  <a:srgbClr val="2B91AF"/>
+                </a:solidFill>
+                <a:latin typeface="Consolas" panose="020B0609020204030204" pitchFamily="49" charset="0"/>
+              </a:rPr>
+              <a:t>Type</a:t>
+            </a:r>
+            <a:r>
+              <a:rPr lang="fr-FR" sz="1800" dirty="0">
+                <a:solidFill>
+                  <a:srgbClr val="000000"/>
+                </a:solidFill>
+                <a:latin typeface="Consolas" panose="020B0609020204030204" pitchFamily="49" charset="0"/>
+              </a:rPr>
+              <a:t> typeA1 = </a:t>
+            </a:r>
+            <a:r>
+              <a:rPr lang="fr-FR" sz="1800" dirty="0" err="1">
+                <a:solidFill>
+                  <a:srgbClr val="0000FF"/>
+                </a:solidFill>
+                <a:latin typeface="Consolas" panose="020B0609020204030204" pitchFamily="49" charset="0"/>
+              </a:rPr>
+              <a:t>typeof</a:t>
+            </a:r>
+            <a:r>
+              <a:rPr lang="fr-FR" sz="1800" dirty="0">
+                <a:solidFill>
+                  <a:srgbClr val="000000"/>
+                </a:solidFill>
+                <a:latin typeface="Consolas" panose="020B0609020204030204" pitchFamily="49" charset="0"/>
+              </a:rPr>
+              <a:t>(</a:t>
+            </a:r>
+            <a:r>
+              <a:rPr lang="fr-FR" dirty="0">
+                <a:solidFill>
+                  <a:srgbClr val="2B91AF"/>
+                </a:solidFill>
+                <a:latin typeface="Consolas" panose="020B0609020204030204" pitchFamily="49" charset="0"/>
+              </a:rPr>
+              <a:t>A</a:t>
+            </a:r>
+            <a:r>
+              <a:rPr lang="fr-FR" sz="1800" dirty="0">
+                <a:solidFill>
+                  <a:srgbClr val="000000"/>
+                </a:solidFill>
+                <a:latin typeface="Consolas" panose="020B0609020204030204" pitchFamily="49" charset="0"/>
+              </a:rPr>
+              <a:t>);</a:t>
+            </a:r>
+          </a:p>
+          <a:p>
+            <a:r>
+              <a:rPr lang="fr-FR" dirty="0">
+                <a:solidFill>
+                  <a:srgbClr val="2B91AF"/>
+                </a:solidFill>
+                <a:latin typeface="Consolas" panose="020B0609020204030204" pitchFamily="49" charset="0"/>
+              </a:rPr>
+              <a:t>A</a:t>
+            </a:r>
+            <a:r>
+              <a:rPr lang="fr-FR" sz="1800" dirty="0">
+                <a:solidFill>
+                  <a:srgbClr val="000000"/>
+                </a:solidFill>
+                <a:latin typeface="Consolas" panose="020B0609020204030204" pitchFamily="49" charset="0"/>
+              </a:rPr>
+              <a:t> </a:t>
+            </a:r>
+            <a:r>
+              <a:rPr lang="fr-FR" sz="1800" dirty="0" err="1">
+                <a:solidFill>
+                  <a:srgbClr val="000000"/>
+                </a:solidFill>
+                <a:latin typeface="Consolas" panose="020B0609020204030204" pitchFamily="49" charset="0"/>
+              </a:rPr>
+              <a:t>a</a:t>
+            </a:r>
+            <a:r>
+              <a:rPr lang="fr-FR" sz="1800" dirty="0">
+                <a:solidFill>
+                  <a:srgbClr val="000000"/>
+                </a:solidFill>
+                <a:latin typeface="Consolas" panose="020B0609020204030204" pitchFamily="49" charset="0"/>
+              </a:rPr>
+              <a:t> = </a:t>
+            </a:r>
+            <a:r>
+              <a:rPr lang="fr-FR" sz="1800" dirty="0">
+                <a:solidFill>
+                  <a:srgbClr val="0000FF"/>
+                </a:solidFill>
+                <a:latin typeface="Consolas" panose="020B0609020204030204" pitchFamily="49" charset="0"/>
+              </a:rPr>
+              <a:t>new</a:t>
+            </a:r>
+            <a:r>
+              <a:rPr lang="fr-FR" sz="1800" dirty="0">
+                <a:solidFill>
+                  <a:srgbClr val="000000"/>
+                </a:solidFill>
+                <a:latin typeface="Consolas" panose="020B0609020204030204" pitchFamily="49" charset="0"/>
+              </a:rPr>
+              <a:t> </a:t>
+            </a:r>
+            <a:r>
+              <a:rPr lang="fr-FR" dirty="0">
+                <a:solidFill>
+                  <a:srgbClr val="2B91AF"/>
+                </a:solidFill>
+                <a:latin typeface="Consolas" panose="020B0609020204030204" pitchFamily="49" charset="0"/>
+              </a:rPr>
+              <a:t>A</a:t>
+            </a:r>
+            <a:r>
+              <a:rPr lang="fr-FR" sz="1800" dirty="0">
+                <a:solidFill>
+                  <a:srgbClr val="000000"/>
+                </a:solidFill>
+                <a:latin typeface="Consolas" panose="020B0609020204030204" pitchFamily="49" charset="0"/>
+              </a:rPr>
+              <a:t>();</a:t>
+            </a:r>
+          </a:p>
+          <a:p>
+            <a:r>
+              <a:rPr lang="fr-FR" dirty="0">
+                <a:solidFill>
+                  <a:srgbClr val="2B91AF"/>
+                </a:solidFill>
+                <a:latin typeface="Consolas" panose="020B0609020204030204" pitchFamily="49" charset="0"/>
+              </a:rPr>
+              <a:t>Type</a:t>
+            </a:r>
+            <a:r>
+              <a:rPr lang="fr-FR" sz="1800" dirty="0">
+                <a:solidFill>
+                  <a:srgbClr val="000000"/>
+                </a:solidFill>
+                <a:latin typeface="Consolas" panose="020B0609020204030204" pitchFamily="49" charset="0"/>
+              </a:rPr>
+              <a:t> typeA2 = </a:t>
+            </a:r>
+            <a:r>
+              <a:rPr lang="fr-FR" sz="1800" dirty="0" err="1">
+                <a:solidFill>
+                  <a:srgbClr val="000000"/>
+                </a:solidFill>
+                <a:latin typeface="Consolas" panose="020B0609020204030204" pitchFamily="49" charset="0"/>
+              </a:rPr>
+              <a:t>a.GetType</a:t>
+            </a:r>
+            <a:r>
+              <a:rPr lang="fr-FR" sz="1800" dirty="0">
+                <a:solidFill>
+                  <a:srgbClr val="000000"/>
+                </a:solidFill>
+                <a:latin typeface="Consolas" panose="020B0609020204030204" pitchFamily="49" charset="0"/>
+              </a:rPr>
+              <a:t>();</a:t>
+            </a:r>
+          </a:p>
+          <a:p>
+            <a:r>
+              <a:rPr lang="en-US" dirty="0" err="1">
+                <a:solidFill>
+                  <a:srgbClr val="2B91AF"/>
+                </a:solidFill>
+                <a:latin typeface="Consolas" panose="020B0609020204030204" pitchFamily="49" charset="0"/>
+              </a:rPr>
+              <a:t>Console</a:t>
+            </a:r>
+            <a:r>
+              <a:rPr lang="en-US" sz="1800" dirty="0" err="1">
+                <a:solidFill>
+                  <a:srgbClr val="000000"/>
+                </a:solidFill>
+                <a:latin typeface="Consolas" panose="020B0609020204030204" pitchFamily="49" charset="0"/>
+              </a:rPr>
+              <a:t>.WriteLine</a:t>
+            </a:r>
+            <a:r>
+              <a:rPr lang="en-US" sz="1800" dirty="0">
+                <a:solidFill>
+                  <a:srgbClr val="000000"/>
+                </a:solidFill>
+                <a:latin typeface="Consolas" panose="020B0609020204030204" pitchFamily="49" charset="0"/>
+              </a:rPr>
+              <a:t>(typeA1 == typeA2); </a:t>
+            </a:r>
+            <a:r>
+              <a:rPr lang="en-US" sz="1800" dirty="0">
+                <a:solidFill>
+                  <a:srgbClr val="008000"/>
+                </a:solidFill>
+                <a:latin typeface="Consolas" panose="020B0609020204030204" pitchFamily="49" charset="0"/>
+              </a:rPr>
+              <a:t>// display true</a:t>
+            </a:r>
+          </a:p>
+          <a:p>
+            <a:endParaRPr lang="fr-FR" sz="1800" dirty="0">
+              <a:solidFill>
+                <a:srgbClr val="000000"/>
+              </a:solidFill>
+              <a:latin typeface="Consolas" panose="020B0609020204030204" pitchFamily="49" charset="0"/>
+            </a:endParaRPr>
           </a:p>
         </p:txBody>
       </p:sp>
@@ -4127,6 +6978,176 @@
   <p:clrMapOvr>
     <a:masterClrMapping/>
   </p:clrMapOvr>
+  <p:timing>
+    <p:tnLst>
+      <p:par>
+        <p:cTn id="1" dur="indefinite" restart="never" nodeType="tmRoot">
+          <p:childTnLst>
+            <p:seq concurrent="1" nextAc="seek">
+              <p:cTn id="2" dur="indefinite" nodeType="mainSeq">
+                <p:childTnLst>
+                  <p:par>
+                    <p:cTn id="3" fill="hold">
+                      <p:stCondLst>
+                        <p:cond delay="indefinite"/>
+                      </p:stCondLst>
+                      <p:childTnLst>
+                        <p:par>
+                          <p:cTn id="4" fill="hold">
+                            <p:stCondLst>
+                              <p:cond delay="0"/>
+                            </p:stCondLst>
+                            <p:childTnLst>
+                              <p:par>
+                                <p:cTn id="5" presetID="1" presetClass="entr" presetSubtype="0" fill="hold" grpId="0" nodeType="clickEffect">
+                                  <p:stCondLst>
+                                    <p:cond delay="0"/>
+                                  </p:stCondLst>
+                                  <p:childTnLst>
+                                    <p:set>
+                                      <p:cBhvr>
+                                        <p:cTn id="6" dur="1" fill="hold">
+                                          <p:stCondLst>
+                                            <p:cond delay="0"/>
+                                          </p:stCondLst>
+                                        </p:cTn>
+                                        <p:tgtEl>
+                                          <p:spTgt spid="8"/>
+                                        </p:tgtEl>
+                                        <p:attrNameLst>
+                                          <p:attrName>style.visibility</p:attrName>
+                                        </p:attrNameLst>
+                                      </p:cBhvr>
+                                      <p:to>
+                                        <p:strVal val="visible"/>
+                                      </p:to>
+                                    </p:set>
+                                  </p:childTnLst>
+                                </p:cTn>
+                              </p:par>
+                            </p:childTnLst>
+                          </p:cTn>
+                        </p:par>
+                      </p:childTnLst>
+                    </p:cTn>
+                  </p:par>
+                  <p:par>
+                    <p:cTn id="7" fill="hold">
+                      <p:stCondLst>
+                        <p:cond delay="indefinite"/>
+                      </p:stCondLst>
+                      <p:childTnLst>
+                        <p:par>
+                          <p:cTn id="8" fill="hold">
+                            <p:stCondLst>
+                              <p:cond delay="0"/>
+                            </p:stCondLst>
+                            <p:childTnLst>
+                              <p:par>
+                                <p:cTn id="9" presetID="1" presetClass="entr" presetSubtype="0" fill="hold" grpId="0" nodeType="clickEffect">
+                                  <p:stCondLst>
+                                    <p:cond delay="0"/>
+                                  </p:stCondLst>
+                                  <p:childTnLst>
+                                    <p:set>
+                                      <p:cBhvr>
+                                        <p:cTn id="10" dur="1" fill="hold">
+                                          <p:stCondLst>
+                                            <p:cond delay="0"/>
+                                          </p:stCondLst>
+                                        </p:cTn>
+                                        <p:tgtEl>
+                                          <p:spTgt spid="16"/>
+                                        </p:tgtEl>
+                                        <p:attrNameLst>
+                                          <p:attrName>style.visibility</p:attrName>
+                                        </p:attrNameLst>
+                                      </p:cBhvr>
+                                      <p:to>
+                                        <p:strVal val="visible"/>
+                                      </p:to>
+                                    </p:set>
+                                  </p:childTnLst>
+                                </p:cTn>
+                              </p:par>
+                            </p:childTnLst>
+                          </p:cTn>
+                        </p:par>
+                      </p:childTnLst>
+                    </p:cTn>
+                  </p:par>
+                  <p:par>
+                    <p:cTn id="11" fill="hold">
+                      <p:stCondLst>
+                        <p:cond delay="indefinite"/>
+                      </p:stCondLst>
+                      <p:childTnLst>
+                        <p:par>
+                          <p:cTn id="12" fill="hold">
+                            <p:stCondLst>
+                              <p:cond delay="0"/>
+                            </p:stCondLst>
+                            <p:childTnLst>
+                              <p:par>
+                                <p:cTn id="13" presetID="1" presetClass="entr" presetSubtype="0" fill="hold" grpId="0" nodeType="clickEffect">
+                                  <p:stCondLst>
+                                    <p:cond delay="0"/>
+                                  </p:stCondLst>
+                                  <p:childTnLst>
+                                    <p:set>
+                                      <p:cBhvr>
+                                        <p:cTn id="14" dur="1" fill="hold">
+                                          <p:stCondLst>
+                                            <p:cond delay="0"/>
+                                          </p:stCondLst>
+                                        </p:cTn>
+                                        <p:tgtEl>
+                                          <p:spTgt spid="14"/>
+                                        </p:tgtEl>
+                                        <p:attrNameLst>
+                                          <p:attrName>style.visibility</p:attrName>
+                                        </p:attrNameLst>
+                                      </p:cBhvr>
+                                      <p:to>
+                                        <p:strVal val="visible"/>
+                                      </p:to>
+                                    </p:set>
+                                  </p:childTnLst>
+                                </p:cTn>
+                              </p:par>
+                            </p:childTnLst>
+                          </p:cTn>
+                        </p:par>
+                      </p:childTnLst>
+                    </p:cTn>
+                  </p:par>
+                </p:childTnLst>
+              </p:cTn>
+              <p:prevCondLst>
+                <p:cond evt="onPrev" delay="0">
+                  <p:tgtEl>
+                    <p:sldTgt/>
+                  </p:tgtEl>
+                </p:cond>
+              </p:prevCondLst>
+              <p:nextCondLst>
+                <p:cond evt="onNext" delay="0">
+                  <p:tgtEl>
+                    <p:sldTgt/>
+                  </p:tgtEl>
+                </p:cond>
+              </p:nextCondLst>
+            </p:seq>
+          </p:childTnLst>
+        </p:cTn>
+      </p:par>
+    </p:tnLst>
+    <p:bldLst>
+      <p:bldP spid="8" grpId="0"/>
+      <p:bldP spid="14" grpId="0"/>
+      <p:bldP spid="16" grpId="0"/>
+    </p:bldLst>
+  </p:timing>
 </p:sld>
 </file>
 
@@ -4372,44 +7393,44 @@
 </file>
 
 <file path=ppt/theme/theme1.xml><?xml version="1.0" encoding="utf-8"?>
-<a:theme xmlns:a="http://schemas.openxmlformats.org/drawingml/2006/main" name="Rétrospective">
+<a:theme xmlns:a="http://schemas.openxmlformats.org/drawingml/2006/main" name="1_Rétrospective">
   <a:themeElements>
-    <a:clrScheme name="Rétrospective">
+    <a:clrScheme name="Bleu chaud">
       <a:dk1>
-        <a:srgbClr val="000000"/>
+        <a:sysClr val="windowText" lastClr="000000"/>
       </a:dk1>
       <a:lt1>
         <a:sysClr val="window" lastClr="FFFFFF"/>
       </a:lt1>
       <a:dk2>
-        <a:srgbClr val="637052"/>
+        <a:srgbClr val="242852"/>
       </a:dk2>
       <a:lt2>
-        <a:srgbClr val="CCDDEA"/>
+        <a:srgbClr val="ACCBF9"/>
       </a:lt2>
       <a:accent1>
-        <a:srgbClr val="E48312"/>
+        <a:srgbClr val="4A66AC"/>
       </a:accent1>
       <a:accent2>
-        <a:srgbClr val="BD582C"/>
+        <a:srgbClr val="629DD1"/>
       </a:accent2>
       <a:accent3>
-        <a:srgbClr val="865640"/>
+        <a:srgbClr val="297FD5"/>
       </a:accent3>
       <a:accent4>
-        <a:srgbClr val="9B8357"/>
+        <a:srgbClr val="7F8FA9"/>
       </a:accent4>
       <a:accent5>
-        <a:srgbClr val="C2BC80"/>
+        <a:srgbClr val="5AA2AE"/>
       </a:accent5>
       <a:accent6>
-        <a:srgbClr val="94A088"/>
+        <a:srgbClr val="9D90A0"/>
       </a:accent6>
       <a:hlink>
-        <a:srgbClr val="2998E3"/>
+        <a:srgbClr val="9454C3"/>
       </a:hlink>
       <a:folHlink>
-        <a:srgbClr val="8C8C8C"/>
+        <a:srgbClr val="3EBBF0"/>
       </a:folHlink>
     </a:clrScheme>
     <a:fontScheme name="Rétrospective">
@@ -4652,4 +7673,299 @@
     </a:ext>
   </a:extLst>
 </a:theme>
+</file>
+
+<file path=ppt/theme/theme2.xml><?xml version="1.0" encoding="utf-8"?>
+<a:theme xmlns:a="http://schemas.openxmlformats.org/drawingml/2006/main" name="Thème Office">
+  <a:themeElements>
+    <a:clrScheme name="Office">
+      <a:dk1>
+        <a:sysClr val="windowText" lastClr="000000"/>
+      </a:dk1>
+      <a:lt1>
+        <a:sysClr val="window" lastClr="FFFFFF"/>
+      </a:lt1>
+      <a:dk2>
+        <a:srgbClr val="44546A"/>
+      </a:dk2>
+      <a:lt2>
+        <a:srgbClr val="E7E6E6"/>
+      </a:lt2>
+      <a:accent1>
+        <a:srgbClr val="4472C4"/>
+      </a:accent1>
+      <a:accent2>
+        <a:srgbClr val="ED7D31"/>
+      </a:accent2>
+      <a:accent3>
+        <a:srgbClr val="A5A5A5"/>
+      </a:accent3>
+      <a:accent4>
+        <a:srgbClr val="FFC000"/>
+      </a:accent4>
+      <a:accent5>
+        <a:srgbClr val="5B9BD5"/>
+      </a:accent5>
+      <a:accent6>
+        <a:srgbClr val="70AD47"/>
+      </a:accent6>
+      <a:hlink>
+        <a:srgbClr val="0563C1"/>
+      </a:hlink>
+      <a:folHlink>
+        <a:srgbClr val="954F72"/>
+      </a:folHlink>
+    </a:clrScheme>
+    <a:fontScheme name="Office">
+      <a:majorFont>
+        <a:latin typeface="Calibri Light" panose="020F0302020204030204"/>
+        <a:ea typeface=""/>
+        <a:cs typeface=""/>
+        <a:font script="Jpan" typeface="游ゴシック Light"/>
+        <a:font script="Hang" typeface="맑은 고딕"/>
+        <a:font script="Hans" typeface="等线 Light"/>
+        <a:font script="Hant" typeface="新細明體"/>
+        <a:font script="Arab" typeface="Times New Roman"/>
+        <a:font script="Hebr" typeface="Times New Roman"/>
+        <a:font script="Thai" typeface="Angsana New"/>
+        <a:font script="Ethi" typeface="Nyala"/>
+        <a:font script="Beng" typeface="Vrinda"/>
+        <a:font script="Gujr" typeface="Shruti"/>
+        <a:font script="Khmr" typeface="MoolBoran"/>
+        <a:font script="Knda" typeface="Tunga"/>
+        <a:font script="Guru" typeface="Raavi"/>
+        <a:font script="Cans" typeface="Euphemia"/>
+        <a:font script="Cher" typeface="Plantagenet Cherokee"/>
+        <a:font script="Yiii" typeface="Microsoft Yi Baiti"/>
+        <a:font script="Tibt" typeface="Microsoft Himalaya"/>
+        <a:font script="Thaa" typeface="MV Boli"/>
+        <a:font script="Deva" typeface="Mangal"/>
+        <a:font script="Telu" typeface="Gautami"/>
+        <a:font script="Taml" typeface="Latha"/>
+        <a:font script="Syrc" typeface="Estrangelo Edessa"/>
+        <a:font script="Orya" typeface="Kalinga"/>
+        <a:font script="Mlym" typeface="Kartika"/>
+        <a:font script="Laoo" typeface="DokChampa"/>
+        <a:font script="Sinh" typeface="Iskoola Pota"/>
+        <a:font script="Mong" typeface="Mongolian Baiti"/>
+        <a:font script="Viet" typeface="Times New Roman"/>
+        <a:font script="Uigh" typeface="Microsoft Uighur"/>
+        <a:font script="Geor" typeface="Sylfaen"/>
+        <a:font script="Armn" typeface="Arial"/>
+        <a:font script="Bugi" typeface="Leelawadee UI"/>
+        <a:font script="Bopo" typeface="Microsoft JhengHei"/>
+        <a:font script="Java" typeface="Javanese Text"/>
+        <a:font script="Lisu" typeface="Segoe UI"/>
+        <a:font script="Mymr" typeface="Myanmar Text"/>
+        <a:font script="Nkoo" typeface="Ebrima"/>
+        <a:font script="Olck" typeface="Nirmala UI"/>
+        <a:font script="Osma" typeface="Ebrima"/>
+        <a:font script="Phag" typeface="Phagspa"/>
+        <a:font script="Syrn" typeface="Estrangelo Edessa"/>
+        <a:font script="Syrj" typeface="Estrangelo Edessa"/>
+        <a:font script="Syre" typeface="Estrangelo Edessa"/>
+        <a:font script="Sora" typeface="Nirmala UI"/>
+        <a:font script="Tale" typeface="Microsoft Tai Le"/>
+        <a:font script="Talu" typeface="Microsoft New Tai Lue"/>
+        <a:font script="Tfng" typeface="Ebrima"/>
+      </a:majorFont>
+      <a:minorFont>
+        <a:latin typeface="Calibri" panose="020F0502020204030204"/>
+        <a:ea typeface=""/>
+        <a:cs typeface=""/>
+        <a:font script="Jpan" typeface="游ゴシック"/>
+        <a:font script="Hang" typeface="맑은 고딕"/>
+        <a:font script="Hans" typeface="等线"/>
+        <a:font script="Hant" typeface="新細明體"/>
+        <a:font script="Arab" typeface="Arial"/>
+        <a:font script="Hebr" typeface="Arial"/>
+        <a:font script="Thai" typeface="Cordia New"/>
+        <a:font script="Ethi" typeface="Nyala"/>
+        <a:font script="Beng" typeface="Vrinda"/>
+        <a:font script="Gujr" typeface="Shruti"/>
+        <a:font script="Khmr" typeface="DaunPenh"/>
+        <a:font script="Knda" typeface="Tunga"/>
+        <a:font script="Guru" typeface="Raavi"/>
+        <a:font script="Cans" typeface="Euphemia"/>
+        <a:font script="Cher" typeface="Plantagenet Cherokee"/>
+        <a:font script="Yiii" typeface="Microsoft Yi Baiti"/>
+        <a:font script="Tibt" typeface="Microsoft Himalaya"/>
+        <a:font script="Thaa" typeface="MV Boli"/>
+        <a:font script="Deva" typeface="Mangal"/>
+        <a:font script="Telu" typeface="Gautami"/>
+        <a:font script="Taml" typeface="Latha"/>
+        <a:font script="Syrc" typeface="Estrangelo Edessa"/>
+        <a:font script="Orya" typeface="Kalinga"/>
+        <a:font script="Mlym" typeface="Kartika"/>
+        <a:font script="Laoo" typeface="DokChampa"/>
+        <a:font script="Sinh" typeface="Iskoola Pota"/>
+        <a:font script="Mong" typeface="Mongolian Baiti"/>
+        <a:font script="Viet" typeface="Arial"/>
+        <a:font script="Uigh" typeface="Microsoft Uighur"/>
+        <a:font script="Geor" typeface="Sylfaen"/>
+        <a:font script="Armn" typeface="Arial"/>
+        <a:font script="Bugi" typeface="Leelawadee UI"/>
+        <a:font script="Bopo" typeface="Microsoft JhengHei"/>
+        <a:font script="Java" typeface="Javanese Text"/>
+        <a:font script="Lisu" typeface="Segoe UI"/>
+        <a:font script="Mymr" typeface="Myanmar Text"/>
+        <a:font script="Nkoo" typeface="Ebrima"/>
+        <a:font script="Olck" typeface="Nirmala UI"/>
+        <a:font script="Osma" typeface="Ebrima"/>
+        <a:font script="Phag" typeface="Phagspa"/>
+        <a:font script="Syrn" typeface="Estrangelo Edessa"/>
+        <a:font script="Syrj" typeface="Estrangelo Edessa"/>
+        <a:font script="Syre" typeface="Estrangelo Edessa"/>
+        <a:font script="Sora" typeface="Nirmala UI"/>
+        <a:font script="Tale" typeface="Microsoft Tai Le"/>
+        <a:font script="Talu" typeface="Microsoft New Tai Lue"/>
+        <a:font script="Tfng" typeface="Ebrima"/>
+      </a:minorFont>
+    </a:fontScheme>
+    <a:fmtScheme name="Office">
+      <a:fillStyleLst>
+        <a:solidFill>
+          <a:schemeClr val="phClr"/>
+        </a:solidFill>
+        <a:gradFill rotWithShape="1">
+          <a:gsLst>
+            <a:gs pos="0">
+              <a:schemeClr val="phClr">
+                <a:lumMod val="110000"/>
+                <a:satMod val="105000"/>
+                <a:tint val="67000"/>
+              </a:schemeClr>
+            </a:gs>
+            <a:gs pos="50000">
+              <a:schemeClr val="phClr">
+                <a:lumMod val="105000"/>
+                <a:satMod val="103000"/>
+                <a:tint val="73000"/>
+              </a:schemeClr>
+            </a:gs>
+            <a:gs pos="100000">
+              <a:schemeClr val="phClr">
+                <a:lumMod val="105000"/>
+                <a:satMod val="109000"/>
+                <a:tint val="81000"/>
+              </a:schemeClr>
+            </a:gs>
+          </a:gsLst>
+          <a:lin ang="5400000" scaled="0"/>
+        </a:gradFill>
+        <a:gradFill rotWithShape="1">
+          <a:gsLst>
+            <a:gs pos="0">
+              <a:schemeClr val="phClr">
+                <a:satMod val="103000"/>
+                <a:lumMod val="102000"/>
+                <a:tint val="94000"/>
+              </a:schemeClr>
+            </a:gs>
+            <a:gs pos="50000">
+              <a:schemeClr val="phClr">
+                <a:satMod val="110000"/>
+                <a:lumMod val="100000"/>
+                <a:shade val="100000"/>
+              </a:schemeClr>
+            </a:gs>
+            <a:gs pos="100000">
+              <a:schemeClr val="phClr">
+                <a:lumMod val="99000"/>
+                <a:satMod val="120000"/>
+                <a:shade val="78000"/>
+              </a:schemeClr>
+            </a:gs>
+          </a:gsLst>
+          <a:lin ang="5400000" scaled="0"/>
+        </a:gradFill>
+      </a:fillStyleLst>
+      <a:lnStyleLst>
+        <a:ln w="6350" cap="flat" cmpd="sng" algn="ctr">
+          <a:solidFill>
+            <a:schemeClr val="phClr"/>
+          </a:solidFill>
+          <a:prstDash val="solid"/>
+          <a:miter lim="800000"/>
+        </a:ln>
+        <a:ln w="12700" cap="flat" cmpd="sng" algn="ctr">
+          <a:solidFill>
+            <a:schemeClr val="phClr"/>
+          </a:solidFill>
+          <a:prstDash val="solid"/>
+          <a:miter lim="800000"/>
+        </a:ln>
+        <a:ln w="19050" cap="flat" cmpd="sng" algn="ctr">
+          <a:solidFill>
+            <a:schemeClr val="phClr"/>
+          </a:solidFill>
+          <a:prstDash val="solid"/>
+          <a:miter lim="800000"/>
+        </a:ln>
+      </a:lnStyleLst>
+      <a:effectStyleLst>
+        <a:effectStyle>
+          <a:effectLst/>
+        </a:effectStyle>
+        <a:effectStyle>
+          <a:effectLst/>
+        </a:effectStyle>
+        <a:effectStyle>
+          <a:effectLst>
+            <a:outerShdw blurRad="57150" dist="19050" dir="5400000" algn="ctr" rotWithShape="0">
+              <a:srgbClr val="000000">
+                <a:alpha val="63000"/>
+              </a:srgbClr>
+            </a:outerShdw>
+          </a:effectLst>
+        </a:effectStyle>
+      </a:effectStyleLst>
+      <a:bgFillStyleLst>
+        <a:solidFill>
+          <a:schemeClr val="phClr"/>
+        </a:solidFill>
+        <a:solidFill>
+          <a:schemeClr val="phClr">
+            <a:tint val="95000"/>
+            <a:satMod val="170000"/>
+          </a:schemeClr>
+        </a:solidFill>
+        <a:gradFill rotWithShape="1">
+          <a:gsLst>
+            <a:gs pos="0">
+              <a:schemeClr val="phClr">
+                <a:tint val="93000"/>
+                <a:satMod val="150000"/>
+                <a:shade val="98000"/>
+                <a:lumMod val="102000"/>
+              </a:schemeClr>
+            </a:gs>
+            <a:gs pos="50000">
+              <a:schemeClr val="phClr">
+                <a:tint val="98000"/>
+                <a:satMod val="130000"/>
+                <a:shade val="90000"/>
+                <a:lumMod val="103000"/>
+              </a:schemeClr>
+            </a:gs>
+            <a:gs pos="100000">
+              <a:schemeClr val="phClr">
+                <a:shade val="63000"/>
+                <a:satMod val="120000"/>
+              </a:schemeClr>
+            </a:gs>
+          </a:gsLst>
+          <a:lin ang="5400000" scaled="0"/>
+        </a:gradFill>
+      </a:bgFillStyleLst>
+    </a:fmtScheme>
+  </a:themeElements>
+  <a:objectDefaults/>
+  <a:extraClrSchemeLst/>
+  <a:extLst>
+    <a:ext uri="{05A4C25C-085E-4340-85A3-A5531E510DB2}">
+      <thm15:themeFamily xmlns:thm15="http://schemas.microsoft.com/office/thememl/2012/main" name="Office Theme" id="{62F939B6-93AF-4DB8-9C6B-D6C7DFDC589F}" vid="{4A3C46E8-61CC-4603-A589-7422A47A8E4A}"/>
+    </a:ext>
+  </a:extLst>
+</a:theme>
 </file>
</xml_diff>